<commit_message>
Added references and made numbers bigger in test function surrogate model
</commit_message>
<xml_diff>
--- a/Poster/AI3SD Poster.pptx
+++ b/Poster/AI3SD Poster.pptx
@@ -16366,10 +16366,10 @@
         </p:nvGrpSpPr>
         <p:grpSpPr>
           <a:xfrm>
-            <a:off x="341824" y="2623113"/>
-            <a:ext cx="2455801" cy="1728049"/>
-            <a:chOff x="344424" y="2615101"/>
-            <a:chExt cx="2455801" cy="1728049"/>
+            <a:off x="330026" y="2623113"/>
+            <a:ext cx="2540946" cy="1831482"/>
+            <a:chOff x="332626" y="2615101"/>
+            <a:chExt cx="2540946" cy="1831482"/>
           </a:xfrm>
         </p:grpSpPr>
         <p:sp>
@@ -16436,13 +16436,13 @@
             <a:blip r:embed="rId7">
               <a:alphaModFix/>
             </a:blip>
-            <a:srcRect/>
+            <a:srcRect r="12255"/>
             <a:stretch/>
           </p:blipFill>
           <p:spPr>
             <a:xfrm>
-              <a:off x="454074" y="2851774"/>
-              <a:ext cx="1036195" cy="1491286"/>
+              <a:off x="332626" y="2851774"/>
+              <a:ext cx="909209" cy="1491286"/>
             </a:xfrm>
             <a:prstGeom prst="rect">
               <a:avLst/>
@@ -16519,8 +16519,8 @@
           </p:nvSpPr>
           <p:spPr>
             <a:xfrm>
-              <a:off x="1572300" y="2863800"/>
-              <a:ext cx="1170300" cy="1477500"/>
+              <a:off x="1165096" y="2830796"/>
+              <a:ext cx="1708476" cy="1615787"/>
             </a:xfrm>
             <a:prstGeom prst="rect">
               <a:avLst/>
@@ -16536,15 +16536,6 @@
             </a:bodyPr>
             <a:lstStyle/>
             <a:p>
-              <a:pPr marL="0" marR="0" lvl="0" indent="0" algn="l" rtl="0">
-                <a:spcBef>
-                  <a:spcPts val="0"/>
-                </a:spcBef>
-                <a:spcAft>
-                  <a:spcPts val="0"/>
-                </a:spcAft>
-                <a:buNone/>
-              </a:pPr>
               <a:r>
                 <a:rPr lang="en" sz="900" dirty="0">
                   <a:solidFill>
@@ -16555,9 +16546,119 @@
                   <a:cs typeface="Calibri"/>
                   <a:sym typeface="Calibri"/>
                 </a:rPr>
-                <a:t>Organic photovoltaic data tabulating molecular structures and power conversion efficiency. Global max c. 11.1%. Able to learn structure-PCE relationship.</a:t>
+                <a:t>Organic photovoltaic data tabulating molecular structures and power conversion efficiency. Global max c. 11.1%. EI took ~ 4 times as long as TS, but produced similar results.</a:t>
               </a:r>
-              <a:endParaRPr dirty="0"/>
+            </a:p>
+            <a:p>
+              <a:r>
+                <a:rPr lang="en" sz="500" dirty="0">
+                  <a:solidFill>
+                    <a:schemeClr val="dk1"/>
+                  </a:solidFill>
+                  <a:effectLst/>
+                  <a:latin typeface="Calibri"/>
+                  <a:cs typeface="Calibri"/>
+                  <a:sym typeface="Calibri"/>
+                </a:rPr>
+                <a:t>Reference: </a:t>
+              </a:r>
+              <a:r>
+                <a:rPr lang="en-GB" sz="500" dirty="0" err="1">
+                  <a:effectLst/>
+                  <a:latin typeface="Calibri" panose="020F0502020204030204" pitchFamily="34" charset="0"/>
+                  <a:cs typeface="Calibri" panose="020F0502020204030204" pitchFamily="34" charset="0"/>
+                </a:rPr>
+                <a:t>Hachmann</a:t>
+              </a:r>
+              <a:r>
+                <a:rPr lang="en-GB" sz="500" dirty="0">
+                  <a:effectLst/>
+                  <a:latin typeface="Calibri" panose="020F0502020204030204" pitchFamily="34" charset="0"/>
+                  <a:cs typeface="Calibri" panose="020F0502020204030204" pitchFamily="34" charset="0"/>
+                </a:rPr>
+                <a:t>, J., Olivares-Amaya, R., </a:t>
+              </a:r>
+              <a:r>
+                <a:rPr lang="en-GB" sz="500" dirty="0" err="1">
+                  <a:effectLst/>
+                  <a:latin typeface="Calibri" panose="020F0502020204030204" pitchFamily="34" charset="0"/>
+                  <a:cs typeface="Calibri" panose="020F0502020204030204" pitchFamily="34" charset="0"/>
+                </a:rPr>
+                <a:t>Atahan-Evrenk</a:t>
+              </a:r>
+              <a:r>
+                <a:rPr lang="en-GB" sz="500" dirty="0">
+                  <a:effectLst/>
+                  <a:latin typeface="Calibri" panose="020F0502020204030204" pitchFamily="34" charset="0"/>
+                  <a:cs typeface="Calibri" panose="020F0502020204030204" pitchFamily="34" charset="0"/>
+                </a:rPr>
+                <a:t>, S., Amador-</a:t>
+              </a:r>
+              <a:r>
+                <a:rPr lang="en-GB" sz="500" dirty="0" err="1">
+                  <a:effectLst/>
+                  <a:latin typeface="Calibri" panose="020F0502020204030204" pitchFamily="34" charset="0"/>
+                  <a:cs typeface="Calibri" panose="020F0502020204030204" pitchFamily="34" charset="0"/>
+                </a:rPr>
+                <a:t>Bedolla</a:t>
+              </a:r>
+              <a:r>
+                <a:rPr lang="en-GB" sz="500" dirty="0">
+                  <a:effectLst/>
+                  <a:latin typeface="Calibri" panose="020F0502020204030204" pitchFamily="34" charset="0"/>
+                  <a:cs typeface="Calibri" panose="020F0502020204030204" pitchFamily="34" charset="0"/>
+                </a:rPr>
+                <a:t>, C., Sánchez-Carrera, R.S., Gold-Parker, A., Vogt, L., Brockway, A.M., </a:t>
+              </a:r>
+              <a:r>
+                <a:rPr lang="en-GB" sz="500" dirty="0" err="1">
+                  <a:effectLst/>
+                  <a:latin typeface="Calibri" panose="020F0502020204030204" pitchFamily="34" charset="0"/>
+                  <a:cs typeface="Calibri" panose="020F0502020204030204" pitchFamily="34" charset="0"/>
+                </a:rPr>
+                <a:t>Aspuru-Guzik</a:t>
+              </a:r>
+              <a:r>
+                <a:rPr lang="en-GB" sz="500" dirty="0">
+                  <a:effectLst/>
+                  <a:latin typeface="Calibri" panose="020F0502020204030204" pitchFamily="34" charset="0"/>
+                  <a:cs typeface="Calibri" panose="020F0502020204030204" pitchFamily="34" charset="0"/>
+                </a:rPr>
+                <a:t>, A., 2011. The Harvard Clean Energy Project: Large-Scale Computational Screening and Design of Organic Photovoltaics on the World Community Grid. J. Phys. Chem. Lett. 2, 2241–2251. </a:t>
+              </a:r>
+              <a:r>
+                <a:rPr lang="en-GB" sz="500" dirty="0">
+                  <a:effectLst/>
+                  <a:latin typeface="Calibri" panose="020F0502020204030204" pitchFamily="34" charset="0"/>
+                  <a:cs typeface="Calibri" panose="020F0502020204030204" pitchFamily="34" charset="0"/>
+                  <a:hlinkClick r:id="rId8"/>
+                </a:rPr>
+                <a:t>https://doi.org/10.1021/jz200866s</a:t>
+              </a:r>
+              <a:endParaRPr lang="en" sz="500" dirty="0">
+                <a:solidFill>
+                  <a:schemeClr val="dk1"/>
+                </a:solidFill>
+                <a:latin typeface="Calibri" panose="020F0502020204030204" pitchFamily="34" charset="0"/>
+                <a:ea typeface="Calibri"/>
+                <a:cs typeface="Calibri" panose="020F0502020204030204" pitchFamily="34" charset="0"/>
+                <a:sym typeface="Calibri"/>
+              </a:endParaRPr>
+            </a:p>
+            <a:p>
+              <a:pPr marL="0" marR="0" lvl="0" indent="0" algn="l" rtl="0">
+                <a:spcBef>
+                  <a:spcPts val="0"/>
+                </a:spcBef>
+                <a:spcAft>
+                  <a:spcPts val="0"/>
+                </a:spcAft>
+                <a:buNone/>
+              </a:pPr>
+              <a:endParaRPr sz="500" dirty="0">
+                <a:latin typeface="Calibri" panose="020F0502020204030204" pitchFamily="34" charset="0"/>
+                <a:cs typeface="Calibri" panose="020F0502020204030204" pitchFamily="34" charset="0"/>
+              </a:endParaRPr>
             </a:p>
           </p:txBody>
         </p:sp>
@@ -16570,10 +16671,10 @@
         </p:nvGrpSpPr>
         <p:grpSpPr>
           <a:xfrm>
-            <a:off x="2913550" y="2629925"/>
-            <a:ext cx="3493010" cy="1728000"/>
-            <a:chOff x="2912350" y="2615175"/>
-            <a:chExt cx="3493010" cy="1728000"/>
+            <a:off x="2889692" y="2629925"/>
+            <a:ext cx="3607839" cy="1956025"/>
+            <a:chOff x="2888492" y="2615175"/>
+            <a:chExt cx="3607839" cy="1956025"/>
           </a:xfrm>
         </p:grpSpPr>
         <p:sp>
@@ -16637,16 +16738,16 @@
             <p:nvPr/>
           </p:nvPicPr>
           <p:blipFill rotWithShape="1">
-            <a:blip r:embed="rId8">
+            <a:blip r:embed="rId9">
               <a:alphaModFix/>
             </a:blip>
-            <a:srcRect/>
+            <a:srcRect r="7208"/>
             <a:stretch/>
           </p:blipFill>
           <p:spPr>
             <a:xfrm>
-              <a:off x="2967075" y="2774050"/>
-              <a:ext cx="2020875" cy="1453925"/>
+              <a:off x="2888492" y="2859778"/>
+              <a:ext cx="1875190" cy="1453925"/>
             </a:xfrm>
             <a:prstGeom prst="rect">
               <a:avLst/>
@@ -16665,8 +16766,8 @@
           </p:nvSpPr>
           <p:spPr>
             <a:xfrm>
-              <a:off x="4965872" y="2863788"/>
-              <a:ext cx="1396800" cy="1477500"/>
+              <a:off x="4686066" y="2816914"/>
+              <a:ext cx="1810265" cy="1754286"/>
             </a:xfrm>
             <a:prstGeom prst="rect">
               <a:avLst/>
@@ -16682,28 +16783,226 @@
             </a:bodyPr>
             <a:lstStyle/>
             <a:p>
-              <a:pPr marL="0" marR="0" lvl="0" indent="0" algn="l" rtl="0">
-                <a:spcBef>
-                  <a:spcPts val="0"/>
-                </a:spcBef>
-                <a:spcAft>
-                  <a:spcPts val="0"/>
-                </a:spcAft>
-                <a:buNone/>
-              </a:pPr>
               <a:r>
-                <a:rPr lang="en" sz="900">
+                <a:rPr lang="en-GB" sz="900" dirty="0">
                   <a:solidFill>
                     <a:schemeClr val="dk1"/>
                   </a:solidFill>
-                  <a:latin typeface="Calibri"/>
+                  <a:latin typeface="Calibri" panose="020F0502020204030204" pitchFamily="34" charset="0"/>
                   <a:ea typeface="Calibri"/>
-                  <a:cs typeface="Calibri"/>
+                  <a:cs typeface="Calibri" panose="020F0502020204030204" pitchFamily="34" charset="0"/>
                   <a:sym typeface="Calibri"/>
                 </a:rPr>
                 <a:t>Optimising Area Count (LC-MS). Initial domain had “holes” due to disallowed combinations, so gave 0 as default.</a:t>
               </a:r>
-              <a:endParaRPr/>
+              <a:r>
+                <a:rPr lang="en-GB" sz="900" dirty="0">
+                  <a:latin typeface="Calibri" panose="020F0502020204030204" pitchFamily="34" charset="0"/>
+                  <a:ea typeface="Calibri"/>
+                  <a:cs typeface="Calibri" panose="020F0502020204030204" pitchFamily="34" charset="0"/>
+                </a:rPr>
+                <a:t> </a:t>
+              </a:r>
+              <a:r>
+                <a:rPr lang="en-GB" sz="900" dirty="0">
+                  <a:solidFill>
+                    <a:schemeClr val="dk1"/>
+                  </a:solidFill>
+                  <a:latin typeface="Calibri" panose="020F0502020204030204" pitchFamily="34" charset="0"/>
+                  <a:ea typeface="Calibri"/>
+                  <a:cs typeface="Calibri" panose="020F0502020204030204" pitchFamily="34" charset="0"/>
+                  <a:sym typeface="Calibri"/>
+                </a:rPr>
+                <a:t>Produced poor results! Subsequently these combinations were excluded – performance markedly improved.</a:t>
+              </a:r>
+            </a:p>
+            <a:p>
+              <a:r>
+                <a:rPr lang="en-GB" sz="500" dirty="0">
+                  <a:solidFill>
+                    <a:schemeClr val="dk1"/>
+                  </a:solidFill>
+                  <a:latin typeface="Calibri" panose="020F0502020204030204" pitchFamily="34" charset="0"/>
+                  <a:cs typeface="Calibri" panose="020F0502020204030204" pitchFamily="34" charset="0"/>
+                  <a:sym typeface="Calibri"/>
+                </a:rPr>
+                <a:t>Reference: </a:t>
+              </a:r>
+              <a:r>
+                <a:rPr lang="en-GB" sz="500" dirty="0">
+                  <a:effectLst/>
+                  <a:latin typeface="Calibri" panose="020F0502020204030204" pitchFamily="34" charset="0"/>
+                  <a:cs typeface="Calibri" panose="020F0502020204030204" pitchFamily="34" charset="0"/>
+                </a:rPr>
+                <a:t>(1)  </a:t>
+              </a:r>
+              <a:r>
+                <a:rPr lang="en-GB" sz="500" dirty="0" err="1">
+                  <a:effectLst/>
+                  <a:latin typeface="Calibri" panose="020F0502020204030204" pitchFamily="34" charset="0"/>
+                  <a:cs typeface="Calibri" panose="020F0502020204030204" pitchFamily="34" charset="0"/>
+                </a:rPr>
+                <a:t>Santanilla</a:t>
+              </a:r>
+              <a:r>
+                <a:rPr lang="en-GB" sz="500" dirty="0">
+                  <a:effectLst/>
+                  <a:latin typeface="Calibri" panose="020F0502020204030204" pitchFamily="34" charset="0"/>
+                  <a:cs typeface="Calibri" panose="020F0502020204030204" pitchFamily="34" charset="0"/>
+                </a:rPr>
+                <a:t>, A. B.; Regalado, E. L.; Pereira, T.; Shevlin, M.; Bateman, K.; Campeau, L.-C.; </a:t>
+              </a:r>
+              <a:r>
+                <a:rPr lang="en-GB" sz="500" dirty="0" err="1">
+                  <a:effectLst/>
+                  <a:latin typeface="Calibri" panose="020F0502020204030204" pitchFamily="34" charset="0"/>
+                  <a:cs typeface="Calibri" panose="020F0502020204030204" pitchFamily="34" charset="0"/>
+                </a:rPr>
+                <a:t>Schneeweis</a:t>
+              </a:r>
+              <a:r>
+                <a:rPr lang="en-GB" sz="500" dirty="0">
+                  <a:effectLst/>
+                  <a:latin typeface="Calibri" panose="020F0502020204030204" pitchFamily="34" charset="0"/>
+                  <a:cs typeface="Calibri" panose="020F0502020204030204" pitchFamily="34" charset="0"/>
+                </a:rPr>
+                <a:t>, J.; </a:t>
+              </a:r>
+              <a:r>
+                <a:rPr lang="en-GB" sz="500" dirty="0" err="1">
+                  <a:effectLst/>
+                  <a:latin typeface="Calibri" panose="020F0502020204030204" pitchFamily="34" charset="0"/>
+                  <a:cs typeface="Calibri" panose="020F0502020204030204" pitchFamily="34" charset="0"/>
+                </a:rPr>
+                <a:t>Berritt</a:t>
+              </a:r>
+              <a:r>
+                <a:rPr lang="en-GB" sz="500" dirty="0">
+                  <a:effectLst/>
+                  <a:latin typeface="Calibri" panose="020F0502020204030204" pitchFamily="34" charset="0"/>
+                  <a:cs typeface="Calibri" panose="020F0502020204030204" pitchFamily="34" charset="0"/>
+                </a:rPr>
+                <a:t>, S.; Shi, Z.-C.; </a:t>
+              </a:r>
+              <a:r>
+                <a:rPr lang="en-GB" sz="500" dirty="0" err="1">
+                  <a:effectLst/>
+                  <a:latin typeface="Calibri" panose="020F0502020204030204" pitchFamily="34" charset="0"/>
+                  <a:cs typeface="Calibri" panose="020F0502020204030204" pitchFamily="34" charset="0"/>
+                </a:rPr>
+                <a:t>Nantermet</a:t>
+              </a:r>
+              <a:r>
+                <a:rPr lang="en-GB" sz="500" dirty="0">
+                  <a:effectLst/>
+                  <a:latin typeface="Calibri" panose="020F0502020204030204" pitchFamily="34" charset="0"/>
+                  <a:cs typeface="Calibri" panose="020F0502020204030204" pitchFamily="34" charset="0"/>
+                </a:rPr>
+                <a:t>, P.; Liu, Y.; Helmy, R.; Welch, C. J.; </a:t>
+              </a:r>
+              <a:r>
+                <a:rPr lang="en-GB" sz="500" dirty="0" err="1">
+                  <a:effectLst/>
+                  <a:latin typeface="Calibri" panose="020F0502020204030204" pitchFamily="34" charset="0"/>
+                  <a:cs typeface="Calibri" panose="020F0502020204030204" pitchFamily="34" charset="0"/>
+                </a:rPr>
+                <a:t>Vachal</a:t>
+              </a:r>
+              <a:r>
+                <a:rPr lang="en-GB" sz="500" dirty="0">
+                  <a:effectLst/>
+                  <a:latin typeface="Calibri" panose="020F0502020204030204" pitchFamily="34" charset="0"/>
+                  <a:cs typeface="Calibri" panose="020F0502020204030204" pitchFamily="34" charset="0"/>
+                </a:rPr>
+                <a:t>, P.; Davies, I. W.; </a:t>
+              </a:r>
+              <a:r>
+                <a:rPr lang="en-GB" sz="500" dirty="0" err="1">
+                  <a:effectLst/>
+                  <a:latin typeface="Calibri" panose="020F0502020204030204" pitchFamily="34" charset="0"/>
+                  <a:cs typeface="Calibri" panose="020F0502020204030204" pitchFamily="34" charset="0"/>
+                </a:rPr>
+                <a:t>Cernak</a:t>
+              </a:r>
+              <a:r>
+                <a:rPr lang="en-GB" sz="500" dirty="0">
+                  <a:effectLst/>
+                  <a:latin typeface="Calibri" panose="020F0502020204030204" pitchFamily="34" charset="0"/>
+                  <a:cs typeface="Calibri" panose="020F0502020204030204" pitchFamily="34" charset="0"/>
+                </a:rPr>
+                <a:t>, T.; Dreher, S. D. Nanomole-Scale High-Throughput Chemistry for the Synthesis of Complex Molecules. </a:t>
+              </a:r>
+              <a:r>
+                <a:rPr lang="en-GB" sz="500" i="1" dirty="0">
+                  <a:effectLst/>
+                  <a:latin typeface="Calibri" panose="020F0502020204030204" pitchFamily="34" charset="0"/>
+                  <a:cs typeface="Calibri" panose="020F0502020204030204" pitchFamily="34" charset="0"/>
+                </a:rPr>
+                <a:t>Science</a:t>
+              </a:r>
+              <a:r>
+                <a:rPr lang="en-GB" sz="500" dirty="0">
+                  <a:effectLst/>
+                  <a:latin typeface="Calibri" panose="020F0502020204030204" pitchFamily="34" charset="0"/>
+                  <a:cs typeface="Calibri" panose="020F0502020204030204" pitchFamily="34" charset="0"/>
+                </a:rPr>
+                <a:t> </a:t>
+              </a:r>
+              <a:r>
+                <a:rPr lang="en-GB" sz="500" b="1" dirty="0">
+                  <a:effectLst/>
+                  <a:latin typeface="Calibri" panose="020F0502020204030204" pitchFamily="34" charset="0"/>
+                  <a:cs typeface="Calibri" panose="020F0502020204030204" pitchFamily="34" charset="0"/>
+                </a:rPr>
+                <a:t>2015</a:t>
+              </a:r>
+              <a:r>
+                <a:rPr lang="en-GB" sz="500" dirty="0">
+                  <a:effectLst/>
+                  <a:latin typeface="Calibri" panose="020F0502020204030204" pitchFamily="34" charset="0"/>
+                  <a:cs typeface="Calibri" panose="020F0502020204030204" pitchFamily="34" charset="0"/>
+                </a:rPr>
+                <a:t>, </a:t>
+              </a:r>
+              <a:r>
+                <a:rPr lang="en-GB" sz="500" i="1" dirty="0">
+                  <a:effectLst/>
+                  <a:latin typeface="Calibri" panose="020F0502020204030204" pitchFamily="34" charset="0"/>
+                  <a:cs typeface="Calibri" panose="020F0502020204030204" pitchFamily="34" charset="0"/>
+                </a:rPr>
+                <a:t>347</a:t>
+              </a:r>
+              <a:r>
+                <a:rPr lang="en-GB" sz="500" dirty="0">
+                  <a:effectLst/>
+                  <a:latin typeface="Calibri" panose="020F0502020204030204" pitchFamily="34" charset="0"/>
+                  <a:cs typeface="Calibri" panose="020F0502020204030204" pitchFamily="34" charset="0"/>
+                </a:rPr>
+                <a:t> (6217), 49–53. </a:t>
+              </a:r>
+              <a:r>
+                <a:rPr lang="en-GB" sz="500" dirty="0">
+                  <a:effectLst/>
+                  <a:latin typeface="Calibri" panose="020F0502020204030204" pitchFamily="34" charset="0"/>
+                  <a:cs typeface="Calibri" panose="020F0502020204030204" pitchFamily="34" charset="0"/>
+                  <a:hlinkClick r:id="rId10"/>
+                </a:rPr>
+                <a:t>https://doi.org/10.1126/science.1259203</a:t>
+              </a:r>
+              <a:r>
+                <a:rPr lang="en-GB" sz="500" dirty="0">
+                  <a:effectLst/>
+                  <a:latin typeface="Calibri" panose="020F0502020204030204" pitchFamily="34" charset="0"/>
+                  <a:cs typeface="Calibri" panose="020F0502020204030204" pitchFamily="34" charset="0"/>
+                </a:rPr>
+                <a:t>.</a:t>
+              </a:r>
+            </a:p>
+            <a:p>
+              <a:endParaRPr lang="en-GB" sz="500" dirty="0">
+                <a:latin typeface="Calibri" panose="020F0502020204030204" pitchFamily="34" charset="0"/>
+                <a:cs typeface="Calibri" panose="020F0502020204030204" pitchFamily="34" charset="0"/>
+              </a:endParaRPr>
             </a:p>
             <a:p>
               <a:pPr marL="0" marR="0" lvl="0" indent="0" algn="l" rtl="0">
@@ -16715,19 +17014,10 @@
                 </a:spcAft>
                 <a:buNone/>
               </a:pPr>
-              <a:r>
-                <a:rPr lang="en" sz="900">
-                  <a:solidFill>
-                    <a:schemeClr val="dk1"/>
-                  </a:solidFill>
-                  <a:latin typeface="Calibri"/>
-                  <a:ea typeface="Calibri"/>
-                  <a:cs typeface="Calibri"/>
-                  <a:sym typeface="Calibri"/>
-                </a:rPr>
-                <a:t>Produced poor results! Subsequently these combinations were excluded – performance markedly improved.</a:t>
-              </a:r>
-              <a:endParaRPr/>
+              <a:endParaRPr sz="500" dirty="0">
+                <a:latin typeface="Calibri" panose="020F0502020204030204" pitchFamily="34" charset="0"/>
+                <a:cs typeface="Calibri" panose="020F0502020204030204" pitchFamily="34" charset="0"/>
+              </a:endParaRPr>
             </a:p>
           </p:txBody>
         </p:sp>
@@ -16798,10 +17088,10 @@
         </p:nvGrpSpPr>
         <p:grpSpPr>
           <a:xfrm>
-            <a:off x="4162046" y="784019"/>
-            <a:ext cx="4631293" cy="1728000"/>
-            <a:chOff x="4164646" y="791065"/>
-            <a:chExt cx="4631293" cy="1728000"/>
+            <a:off x="4128671" y="784019"/>
+            <a:ext cx="4664668" cy="1889183"/>
+            <a:chOff x="4131271" y="791065"/>
+            <a:chExt cx="4664668" cy="1889183"/>
           </a:xfrm>
         </p:grpSpPr>
         <p:sp>
@@ -16865,16 +17155,16 @@
             <p:nvPr/>
           </p:nvPicPr>
           <p:blipFill rotWithShape="1">
-            <a:blip r:embed="rId9">
+            <a:blip r:embed="rId11">
               <a:alphaModFix/>
             </a:blip>
-            <a:srcRect/>
+            <a:srcRect r="2911"/>
             <a:stretch/>
           </p:blipFill>
           <p:spPr>
             <a:xfrm>
-              <a:off x="5792642" y="1080262"/>
-              <a:ext cx="2659279" cy="1438803"/>
+              <a:off x="6192699" y="1080262"/>
+              <a:ext cx="2581866" cy="1438803"/>
             </a:xfrm>
             <a:prstGeom prst="rect">
               <a:avLst/>
@@ -16893,8 +17183,8 @@
           </p:nvSpPr>
           <p:spPr>
             <a:xfrm>
-              <a:off x="4238431" y="1069404"/>
-              <a:ext cx="1503900" cy="1339200"/>
+              <a:off x="4131271" y="1033684"/>
+              <a:ext cx="2217705" cy="1646564"/>
             </a:xfrm>
             <a:prstGeom prst="rect">
               <a:avLst/>
@@ -16920,7 +17210,7 @@
                 <a:buNone/>
               </a:pPr>
               <a:r>
-                <a:rPr lang="en" sz="900">
+                <a:rPr lang="en" sz="900" dirty="0">
                   <a:solidFill>
                     <a:schemeClr val="dk1"/>
                   </a:solidFill>
@@ -16929,9 +17219,108 @@
                   <a:cs typeface="Calibri"/>
                   <a:sym typeface="Calibri"/>
                 </a:rPr>
-                <a:t>Original paper that designed the EDBO optimiser. Tested on Suzuki yield dataset with 50 random initialisations per configuration. Aim was to determine dependence on batch size. Results indicate stable performance.</a:t>
+                <a:t>Original paper that designed the EDBO optimiser. Tested on Suzuki yield dataset with 50 random initialisations per configuration. Aim was to determine dependence on batch size. Results indicate stable performance. Expected improvement consistently outperforms thompson sampling.</a:t>
               </a:r>
-              <a:endParaRPr/>
+            </a:p>
+            <a:p>
+              <a:r>
+                <a:rPr lang="en" sz="500" dirty="0">
+                  <a:solidFill>
+                    <a:schemeClr val="dk1"/>
+                  </a:solidFill>
+                  <a:latin typeface="Calibri"/>
+                  <a:ea typeface="Calibri"/>
+                  <a:cs typeface="Calibri"/>
+                  <a:sym typeface="Calibri"/>
+                </a:rPr>
+                <a:t>Reference:</a:t>
+              </a:r>
+              <a:r>
+                <a:rPr lang="en" sz="500" dirty="0">
+                  <a:solidFill>
+                    <a:schemeClr val="dk1"/>
+                  </a:solidFill>
+                  <a:latin typeface="Calibri" panose="020F0502020204030204" pitchFamily="34" charset="0"/>
+                  <a:ea typeface="Calibri"/>
+                  <a:cs typeface="Calibri" panose="020F0502020204030204" pitchFamily="34" charset="0"/>
+                  <a:sym typeface="Calibri"/>
+                </a:rPr>
+                <a:t> </a:t>
+              </a:r>
+              <a:r>
+                <a:rPr lang="en-GB" sz="500" dirty="0">
+                  <a:effectLst/>
+                  <a:latin typeface="Calibri" panose="020F0502020204030204" pitchFamily="34" charset="0"/>
+                  <a:cs typeface="Calibri" panose="020F0502020204030204" pitchFamily="34" charset="0"/>
+                </a:rPr>
+                <a:t>Shields, B.J., Stevens, J., Li, J., </a:t>
+              </a:r>
+              <a:r>
+                <a:rPr lang="en-GB" sz="500" dirty="0" err="1">
+                  <a:effectLst/>
+                  <a:latin typeface="Calibri" panose="020F0502020204030204" pitchFamily="34" charset="0"/>
+                  <a:cs typeface="Calibri" panose="020F0502020204030204" pitchFamily="34" charset="0"/>
+                </a:rPr>
+                <a:t>Parasram</a:t>
+              </a:r>
+              <a:r>
+                <a:rPr lang="en-GB" sz="500" dirty="0">
+                  <a:effectLst/>
+                  <a:latin typeface="Calibri" panose="020F0502020204030204" pitchFamily="34" charset="0"/>
+                  <a:cs typeface="Calibri" panose="020F0502020204030204" pitchFamily="34" charset="0"/>
+                </a:rPr>
+                <a:t>, M., </a:t>
+              </a:r>
+              <a:r>
+                <a:rPr lang="en-GB" sz="500" dirty="0" err="1">
+                  <a:effectLst/>
+                  <a:latin typeface="Calibri" panose="020F0502020204030204" pitchFamily="34" charset="0"/>
+                  <a:cs typeface="Calibri" panose="020F0502020204030204" pitchFamily="34" charset="0"/>
+                </a:rPr>
+                <a:t>Damani</a:t>
+              </a:r>
+              <a:r>
+                <a:rPr lang="en-GB" sz="500" dirty="0">
+                  <a:effectLst/>
+                  <a:latin typeface="Calibri" panose="020F0502020204030204" pitchFamily="34" charset="0"/>
+                  <a:cs typeface="Calibri" panose="020F0502020204030204" pitchFamily="34" charset="0"/>
+                </a:rPr>
+                <a:t>, F., Alvarado, J.I.M., Janey, J.M., Adams, R.P., Doyle, A.G., 2021. Bayesian reaction optimization as a tool for chemical synthesis. Nature 590, 89–96. </a:t>
+              </a:r>
+              <a:r>
+                <a:rPr lang="en-GB" sz="500" dirty="0">
+                  <a:effectLst/>
+                  <a:latin typeface="Calibri" panose="020F0502020204030204" pitchFamily="34" charset="0"/>
+                  <a:cs typeface="Calibri" panose="020F0502020204030204" pitchFamily="34" charset="0"/>
+                  <a:hlinkClick r:id="rId12"/>
+                </a:rPr>
+                <a:t>https://doi.org/10.1038/s41586-021-03213-y</a:t>
+              </a:r>
+              <a:endParaRPr lang="en-GB" sz="400" dirty="0">
+                <a:effectLst/>
+                <a:latin typeface="Calibri" panose="020F0502020204030204" pitchFamily="34" charset="0"/>
+                <a:cs typeface="Calibri" panose="020F0502020204030204" pitchFamily="34" charset="0"/>
+              </a:endParaRPr>
+            </a:p>
+            <a:p>
+              <a:pPr marL="0" marR="0" lvl="0" indent="0" algn="l" rtl="0">
+                <a:spcBef>
+                  <a:spcPts val="0"/>
+                </a:spcBef>
+                <a:spcAft>
+                  <a:spcPts val="0"/>
+                </a:spcAft>
+                <a:buNone/>
+              </a:pPr>
+              <a:endParaRPr lang="en" sz="900" dirty="0">
+                <a:solidFill>
+                  <a:schemeClr val="dk1"/>
+                </a:solidFill>
+                <a:latin typeface="Calibri"/>
+                <a:ea typeface="Calibri"/>
+                <a:cs typeface="Calibri"/>
+                <a:sym typeface="Calibri"/>
+              </a:endParaRPr>
             </a:p>
           </p:txBody>
         </p:sp>
@@ -17247,8 +17636,8 @@
           </p:nvSpPr>
           <p:spPr>
             <a:xfrm>
-              <a:off x="2324100" y="1071555"/>
-              <a:ext cx="1715100" cy="1339200"/>
+              <a:off x="2181240" y="1024173"/>
+              <a:ext cx="1830504" cy="1339200"/>
             </a:xfrm>
             <a:prstGeom prst="rect">
               <a:avLst/>
@@ -17274,7 +17663,7 @@
                 <a:buNone/>
               </a:pPr>
               <a:r>
-                <a:rPr lang="en" sz="900">
+                <a:rPr lang="en" sz="900" dirty="0">
                   <a:solidFill>
                     <a:schemeClr val="dk1"/>
                   </a:solidFill>
@@ -17286,7 +17675,7 @@
                 <a:t>From initial observations, construct </a:t>
               </a:r>
               <a:r>
-                <a:rPr lang="en" sz="900" b="1">
+                <a:rPr lang="en" sz="900" b="1" dirty="0">
                   <a:solidFill>
                     <a:schemeClr val="dk1"/>
                   </a:solidFill>
@@ -17298,7 +17687,7 @@
                 <a:t>statistical model</a:t>
               </a:r>
               <a:r>
-                <a:rPr lang="en" sz="900">
+                <a:rPr lang="en" sz="900" dirty="0">
                   <a:solidFill>
                     <a:schemeClr val="dk1"/>
                   </a:solidFill>
@@ -17310,7 +17699,7 @@
                 <a:t>. Then choose new observation based on </a:t>
               </a:r>
               <a:r>
-                <a:rPr lang="en" sz="900" b="1">
+                <a:rPr lang="en" sz="900" b="1" dirty="0">
                   <a:solidFill>
                     <a:schemeClr val="dk1"/>
                   </a:solidFill>
@@ -17322,7 +17711,7 @@
                 <a:t>acquisition function</a:t>
               </a:r>
               <a:r>
-                <a:rPr lang="en" sz="900">
+                <a:rPr lang="en" sz="900" dirty="0">
                   <a:solidFill>
                     <a:schemeClr val="dk1"/>
                   </a:solidFill>
@@ -17333,7 +17722,7 @@
                 </a:rPr>
                 <a:t>:</a:t>
               </a:r>
-              <a:endParaRPr sz="900" b="1">
+              <a:endParaRPr sz="900" b="1" dirty="0">
                 <a:solidFill>
                   <a:schemeClr val="dk1"/>
                 </a:solidFill>
@@ -17359,7 +17748,7 @@
                 <a:buAutoNum type="arabicParenR"/>
               </a:pPr>
               <a:r>
-                <a:rPr lang="en" sz="900">
+                <a:rPr lang="en" sz="900" dirty="0">
                   <a:solidFill>
                     <a:schemeClr val="dk1"/>
                   </a:solidFill>
@@ -17370,7 +17759,7 @@
                 </a:rPr>
                 <a:t>Max uncertainty</a:t>
               </a:r>
-              <a:endParaRPr/>
+              <a:endParaRPr dirty="0"/>
             </a:p>
             <a:p>
               <a:pPr marL="228600" marR="0" lvl="0" indent="-228600" algn="l" rtl="0">
@@ -17388,7 +17777,7 @@
                 <a:buAutoNum type="arabicParenR"/>
               </a:pPr>
               <a:r>
-                <a:rPr lang="en" sz="900">
+                <a:rPr lang="en" sz="900" dirty="0">
                   <a:solidFill>
                     <a:schemeClr val="dk1"/>
                   </a:solidFill>
@@ -17399,7 +17788,7 @@
                 </a:rPr>
                 <a:t>Max mean</a:t>
               </a:r>
-              <a:endParaRPr/>
+              <a:endParaRPr dirty="0"/>
             </a:p>
             <a:p>
               <a:pPr marL="228600" marR="0" lvl="0" indent="-228600" algn="l" rtl="0">
@@ -17417,7 +17806,7 @@
                 <a:buAutoNum type="arabicParenR"/>
               </a:pPr>
               <a:r>
-                <a:rPr lang="en" sz="900">
+                <a:rPr lang="en" sz="900" dirty="0">
                   <a:solidFill>
                     <a:schemeClr val="dk1"/>
                   </a:solidFill>
@@ -17428,7 +17817,7 @@
                 </a:rPr>
                 <a:t>Max mean + uncertainty</a:t>
               </a:r>
-              <a:endParaRPr/>
+              <a:endParaRPr dirty="0"/>
             </a:p>
             <a:p>
               <a:pPr marL="0" marR="0" lvl="0" indent="0" algn="l" rtl="0">
@@ -17441,7 +17830,7 @@
                 <a:buNone/>
               </a:pPr>
               <a:r>
-                <a:rPr lang="en" sz="900">
+                <a:rPr lang="en" sz="900" dirty="0">
                   <a:solidFill>
                     <a:schemeClr val="dk1"/>
                   </a:solidFill>
@@ -17453,7 +17842,7 @@
                 <a:t>In practice a balanced approach like </a:t>
               </a:r>
               <a:r>
-                <a:rPr lang="en" sz="900" b="1">
+                <a:rPr lang="en" sz="900" b="1" dirty="0">
                   <a:solidFill>
                     <a:schemeClr val="dk1"/>
                   </a:solidFill>
@@ -17465,7 +17854,7 @@
                 <a:t>3</a:t>
               </a:r>
               <a:r>
-                <a:rPr lang="en" sz="900">
+                <a:rPr lang="en" sz="900" dirty="0">
                   <a:solidFill>
                     <a:schemeClr val="dk1"/>
                   </a:solidFill>
@@ -17476,7 +17865,7 @@
                 </a:rPr>
                 <a:t> is preferred.</a:t>
               </a:r>
-              <a:endParaRPr/>
+              <a:endParaRPr dirty="0"/>
             </a:p>
           </p:txBody>
         </p:sp>
@@ -17523,7 +17912,7 @@
                 <a:buNone/>
               </a:pPr>
               <a:r>
-                <a:rPr lang="en" sz="1200">
+                <a:rPr lang="en" sz="1200" dirty="0">
                   <a:solidFill>
                     <a:schemeClr val="dk1"/>
                   </a:solidFill>
@@ -17532,39 +17921,12 @@
                   <a:cs typeface="Calibri"/>
                   <a:sym typeface="Calibri"/>
                 </a:rPr>
-                <a:t>Intro to Bayesian Optimisation</a:t>
+                <a:t>Introduction to Bayesian Optimisation</a:t>
               </a:r>
-              <a:endParaRPr/>
+              <a:endParaRPr dirty="0"/>
             </a:p>
           </p:txBody>
         </p:sp>
-        <p:pic>
-          <p:nvPicPr>
-            <p:cNvPr id="163" name="Google Shape;163;p25" descr="Chart&#10;&#10;Description automatically generated"/>
-            <p:cNvPicPr preferRelativeResize="0"/>
-            <p:nvPr/>
-          </p:nvPicPr>
-          <p:blipFill rotWithShape="1">
-            <a:blip r:embed="rId10">
-              <a:alphaModFix/>
-            </a:blip>
-            <a:srcRect/>
-            <a:stretch/>
-          </p:blipFill>
-          <p:spPr>
-            <a:xfrm>
-              <a:off x="361770" y="1041940"/>
-              <a:ext cx="2016000" cy="1439339"/>
-            </a:xfrm>
-            <a:prstGeom prst="rect">
-              <a:avLst/>
-            </a:prstGeom>
-            <a:noFill/>
-            <a:ln>
-              <a:noFill/>
-            </a:ln>
-          </p:spPr>
-        </p:pic>
       </p:grpSp>
       <p:pic>
         <p:nvPicPr>
@@ -17573,7 +17935,7 @@
           <p:nvPr/>
         </p:nvPicPr>
         <p:blipFill>
-          <a:blip r:embed="rId11">
+          <a:blip r:embed="rId13">
             <a:alphaModFix/>
           </a:blip>
           <a:stretch>
@@ -17601,7 +17963,7 @@
           <p:nvPr/>
         </p:nvPicPr>
         <p:blipFill>
-          <a:blip r:embed="rId12">
+          <a:blip r:embed="rId14">
             <a:alphaModFix/>
           </a:blip>
           <a:stretch>
@@ -17629,7 +17991,7 @@
           <p:nvPr/>
         </p:nvPicPr>
         <p:blipFill>
-          <a:blip r:embed="rId13">
+          <a:blip r:embed="rId15">
             <a:alphaModFix/>
           </a:blip>
           <a:stretch>
@@ -17657,7 +18019,7 @@
           <p:nvPr/>
         </p:nvPicPr>
         <p:blipFill>
-          <a:blip r:embed="rId14">
+          <a:blip r:embed="rId16">
             <a:alphaModFix/>
           </a:blip>
           <a:stretch>
@@ -17685,7 +18047,7 @@
           <p:nvPr/>
         </p:nvPicPr>
         <p:blipFill>
-          <a:blip r:embed="rId15">
+          <a:blip r:embed="rId17">
             <a:alphaModFix/>
           </a:blip>
           <a:stretch>
@@ -17704,6 +18066,35 @@
           <a:ln>
             <a:noFill/>
           </a:ln>
+        </p:spPr>
+      </p:pic>
+      <p:pic>
+        <p:nvPicPr>
+          <p:cNvPr id="5" name="Picture 4" descr="Chart&#10;&#10;Description automatically generated">
+            <a:extLst>
+              <a:ext uri="{FF2B5EF4-FFF2-40B4-BE49-F238E27FC236}">
+                <a16:creationId xmlns:a16="http://schemas.microsoft.com/office/drawing/2014/main" id="{16940CD5-E61E-42AA-8A05-97AE2FFF6C17}"/>
+              </a:ext>
+            </a:extLst>
+          </p:cNvPr>
+          <p:cNvPicPr>
+            <a:picLocks noChangeAspect="1"/>
+          </p:cNvPicPr>
+          <p:nvPr/>
+        </p:nvPicPr>
+        <p:blipFill rotWithShape="1">
+          <a:blip r:embed="rId18"/>
+          <a:srcRect l="7275" t="9941" r="8086" b="5366"/>
+          <a:stretch/>
+        </p:blipFill>
+        <p:spPr>
+          <a:xfrm>
+            <a:off x="357193" y="1056394"/>
+            <a:ext cx="1918805" cy="1440000"/>
+          </a:xfrm>
+          <a:prstGeom prst="rect">
+            <a:avLst/>
+          </a:prstGeom>
         </p:spPr>
       </p:pic>
     </p:spTree>

</xml_diff>

<commit_message>
Changed pentagon background colours to match new headers
</commit_message>
<xml_diff>
--- a/Poster/AI3SD Poster.pptx
+++ b/Poster/AI3SD Poster.pptx
@@ -16366,10 +16366,10 @@
         </p:nvGrpSpPr>
         <p:grpSpPr>
           <a:xfrm>
-            <a:off x="330026" y="2623113"/>
-            <a:ext cx="2540946" cy="1831482"/>
-            <a:chOff x="332626" y="2615101"/>
-            <a:chExt cx="2540946" cy="1831482"/>
+            <a:off x="341824" y="2623113"/>
+            <a:ext cx="2519872" cy="1754537"/>
+            <a:chOff x="344424" y="2615101"/>
+            <a:chExt cx="2519872" cy="1754537"/>
           </a:xfrm>
         </p:grpSpPr>
         <p:sp>
@@ -16426,33 +16426,6 @@
             </a:p>
           </p:txBody>
         </p:sp>
-        <p:pic>
-          <p:nvPicPr>
-            <p:cNvPr id="142" name="Google Shape;142;p25" descr="Chart, box and whisker chart&#10;&#10;Description automatically generated"/>
-            <p:cNvPicPr preferRelativeResize="0"/>
-            <p:nvPr/>
-          </p:nvPicPr>
-          <p:blipFill rotWithShape="1">
-            <a:blip r:embed="rId7">
-              <a:alphaModFix/>
-            </a:blip>
-            <a:srcRect r="12255"/>
-            <a:stretch/>
-          </p:blipFill>
-          <p:spPr>
-            <a:xfrm>
-              <a:off x="332626" y="2851774"/>
-              <a:ext cx="909209" cy="1491286"/>
-            </a:xfrm>
-            <a:prstGeom prst="rect">
-              <a:avLst/>
-            </a:prstGeom>
-            <a:noFill/>
-            <a:ln>
-              <a:noFill/>
-            </a:ln>
-          </p:spPr>
-        </p:pic>
         <p:sp>
           <p:nvSpPr>
             <p:cNvPr id="143" name="Google Shape;143;p25"/>
@@ -16468,7 +16441,7 @@
               <a:avLst/>
             </a:prstGeom>
             <a:solidFill>
-              <a:srgbClr val="7D91F3"/>
+              <a:srgbClr val="9D4EDD"/>
             </a:solidFill>
             <a:ln w="12700" cap="flat" cmpd="sng">
               <a:solidFill>
@@ -16496,7 +16469,7 @@
                 <a:buNone/>
               </a:pPr>
               <a:r>
-                <a:rPr lang="en" sz="1200">
+                <a:rPr lang="en" sz="1200" dirty="0">
                   <a:solidFill>
                     <a:schemeClr val="dk1"/>
                   </a:solidFill>
@@ -16507,7 +16480,7 @@
                 </a:rPr>
                 <a:t>Harvard Clean Energy</a:t>
               </a:r>
-              <a:endParaRPr/>
+              <a:endParaRPr dirty="0"/>
             </a:p>
           </p:txBody>
         </p:sp>
@@ -16519,8 +16492,8 @@
           </p:nvSpPr>
           <p:spPr>
             <a:xfrm>
-              <a:off x="1165096" y="2830796"/>
-              <a:ext cx="1708476" cy="1615787"/>
+              <a:off x="1063497" y="2830796"/>
+              <a:ext cx="1800799" cy="1538842"/>
             </a:xfrm>
             <a:prstGeom prst="rect">
               <a:avLst/>
@@ -16631,7 +16604,7 @@
                   <a:effectLst/>
                   <a:latin typeface="Calibri" panose="020F0502020204030204" pitchFamily="34" charset="0"/>
                   <a:cs typeface="Calibri" panose="020F0502020204030204" pitchFamily="34" charset="0"/>
-                  <a:hlinkClick r:id="rId8"/>
+                  <a:hlinkClick r:id="rId7"/>
                 </a:rPr>
                 <a:t>https://doi.org/10.1021/jz200866s</a:t>
               </a:r>
@@ -16738,7 +16711,7 @@
             <p:nvPr/>
           </p:nvPicPr>
           <p:blipFill rotWithShape="1">
-            <a:blip r:embed="rId9">
+            <a:blip r:embed="rId8">
               <a:alphaModFix/>
             </a:blip>
             <a:srcRect r="7208"/>
@@ -16985,7 +16958,7 @@
                   <a:effectLst/>
                   <a:latin typeface="Calibri" panose="020F0502020204030204" pitchFamily="34" charset="0"/>
                   <a:cs typeface="Calibri" panose="020F0502020204030204" pitchFamily="34" charset="0"/>
-                  <a:hlinkClick r:id="rId10"/>
+                  <a:hlinkClick r:id="rId9"/>
                 </a:rPr>
                 <a:t>https://doi.org/10.1126/science.1259203</a:t>
               </a:r>
@@ -17036,7 +17009,7 @@
               <a:avLst/>
             </a:prstGeom>
             <a:solidFill>
-              <a:srgbClr val="7D91F3"/>
+              <a:srgbClr val="9D4EDD"/>
             </a:solidFill>
             <a:ln w="12700" cap="flat" cmpd="sng">
               <a:solidFill>
@@ -17064,7 +17037,7 @@
                 <a:buNone/>
               </a:pPr>
               <a:r>
-                <a:rPr lang="en" sz="1200">
+                <a:rPr lang="en" sz="1200" dirty="0">
                   <a:solidFill>
                     <a:schemeClr val="dk1"/>
                   </a:solidFill>
@@ -17075,7 +17048,7 @@
                 </a:rPr>
                 <a:t>Nanomole-scale high-throughput screening</a:t>
               </a:r>
-              <a:endParaRPr/>
+              <a:endParaRPr dirty="0"/>
             </a:p>
           </p:txBody>
         </p:sp>
@@ -17088,7 +17061,7 @@
         </p:nvGrpSpPr>
         <p:grpSpPr>
           <a:xfrm>
-            <a:off x="4128671" y="784019"/>
+            <a:off x="4128671" y="784029"/>
             <a:ext cx="4664668" cy="1889183"/>
             <a:chOff x="4131271" y="791065"/>
             <a:chExt cx="4664668" cy="1889183"/>
@@ -17148,33 +17121,6 @@
             </a:p>
           </p:txBody>
         </p:sp>
-        <p:pic>
-          <p:nvPicPr>
-            <p:cNvPr id="152" name="Google Shape;152;p25" descr="Chart&#10;&#10;Description automatically generated"/>
-            <p:cNvPicPr preferRelativeResize="0"/>
-            <p:nvPr/>
-          </p:nvPicPr>
-          <p:blipFill rotWithShape="1">
-            <a:blip r:embed="rId11">
-              <a:alphaModFix/>
-            </a:blip>
-            <a:srcRect r="2911"/>
-            <a:stretch/>
-          </p:blipFill>
-          <p:spPr>
-            <a:xfrm>
-              <a:off x="6192699" y="1080262"/>
-              <a:ext cx="2581866" cy="1438803"/>
-            </a:xfrm>
-            <a:prstGeom prst="rect">
-              <a:avLst/>
-            </a:prstGeom>
-            <a:noFill/>
-            <a:ln>
-              <a:noFill/>
-            </a:ln>
-          </p:spPr>
-        </p:pic>
         <p:sp>
           <p:nvSpPr>
             <p:cNvPr id="153" name="Google Shape;153;p25"/>
@@ -17184,7 +17130,7 @@
           <p:spPr>
             <a:xfrm>
               <a:off x="4131271" y="1033684"/>
-              <a:ext cx="2217705" cy="1646564"/>
+              <a:ext cx="2012055" cy="1646564"/>
             </a:xfrm>
             <a:prstGeom prst="rect">
               <a:avLst/>
@@ -17292,7 +17238,7 @@
                   <a:effectLst/>
                   <a:latin typeface="Calibri" panose="020F0502020204030204" pitchFamily="34" charset="0"/>
                   <a:cs typeface="Calibri" panose="020F0502020204030204" pitchFamily="34" charset="0"/>
-                  <a:hlinkClick r:id="rId12"/>
+                  <a:hlinkClick r:id="rId10"/>
                 </a:rPr>
                 <a:t>https://doi.org/10.1038/s41586-021-03213-y</a:t>
               </a:r>
@@ -17339,7 +17285,7 @@
               <a:avLst/>
             </a:prstGeom>
             <a:solidFill>
-              <a:srgbClr val="7D91F3"/>
+              <a:srgbClr val="9D4EDD"/>
             </a:solidFill>
             <a:ln w="12700" cap="flat" cmpd="sng">
               <a:solidFill>
@@ -17367,7 +17313,7 @@
                 <a:buNone/>
               </a:pPr>
               <a:r>
-                <a:rPr lang="en" sz="1200">
+                <a:rPr lang="en" sz="1200" dirty="0">
                   <a:solidFill>
                     <a:schemeClr val="dk1"/>
                   </a:solidFill>
@@ -17378,7 +17324,7 @@
                 </a:rPr>
                 <a:t>Suzuki reaction yield dataset</a:t>
               </a:r>
-              <a:endParaRPr/>
+              <a:endParaRPr dirty="0"/>
             </a:p>
           </p:txBody>
         </p:sp>
@@ -17466,7 +17412,7 @@
               <a:avLst/>
             </a:prstGeom>
             <a:solidFill>
-              <a:srgbClr val="7D91F3"/>
+              <a:srgbClr val="9D4EDD"/>
             </a:solidFill>
             <a:ln w="12700" cap="flat" cmpd="sng">
               <a:solidFill>
@@ -17494,7 +17440,7 @@
                 <a:buNone/>
               </a:pPr>
               <a:r>
-                <a:rPr lang="en" sz="1200">
+                <a:rPr lang="en" sz="1200" dirty="0">
                   <a:solidFill>
                     <a:schemeClr val="dk1"/>
                   </a:solidFill>
@@ -17505,7 +17451,7 @@
                 </a:rPr>
                 <a:t>Conclusions</a:t>
               </a:r>
-              <a:endParaRPr/>
+              <a:endParaRPr dirty="0"/>
             </a:p>
           </p:txBody>
         </p:sp>
@@ -17884,7 +17830,7 @@
               <a:avLst/>
             </a:prstGeom>
             <a:solidFill>
-              <a:srgbClr val="7D91F3"/>
+              <a:srgbClr val="9D4EDD"/>
             </a:solidFill>
             <a:ln w="12700" cap="flat" cmpd="sng">
               <a:solidFill>
@@ -17930,146 +17876,6 @@
       </p:grpSp>
       <p:pic>
         <p:nvPicPr>
-          <p:cNvPr id="164" name="Google Shape;164;p25"/>
-          <p:cNvPicPr preferRelativeResize="0"/>
-          <p:nvPr/>
-        </p:nvPicPr>
-        <p:blipFill>
-          <a:blip r:embed="rId13">
-            <a:alphaModFix/>
-          </a:blip>
-          <a:stretch>
-            <a:fillRect/>
-          </a:stretch>
-        </p:blipFill>
-        <p:spPr>
-          <a:xfrm>
-            <a:off x="3805925" y="819175"/>
-            <a:ext cx="200050" cy="197054"/>
-          </a:xfrm>
-          <a:prstGeom prst="rect">
-            <a:avLst/>
-          </a:prstGeom>
-          <a:noFill/>
-          <a:ln>
-            <a:noFill/>
-          </a:ln>
-        </p:spPr>
-      </p:pic>
-      <p:pic>
-        <p:nvPicPr>
-          <p:cNvPr id="165" name="Google Shape;165;p25"/>
-          <p:cNvPicPr preferRelativeResize="0"/>
-          <p:nvPr/>
-        </p:nvPicPr>
-        <p:blipFill>
-          <a:blip r:embed="rId14">
-            <a:alphaModFix/>
-          </a:blip>
-          <a:stretch>
-            <a:fillRect/>
-          </a:stretch>
-        </p:blipFill>
-        <p:spPr>
-          <a:xfrm>
-            <a:off x="8553119" y="819000"/>
-            <a:ext cx="200052" cy="197396"/>
-          </a:xfrm>
-          <a:prstGeom prst="rect">
-            <a:avLst/>
-          </a:prstGeom>
-          <a:noFill/>
-          <a:ln>
-            <a:noFill/>
-          </a:ln>
-        </p:spPr>
-      </p:pic>
-      <p:pic>
-        <p:nvPicPr>
-          <p:cNvPr id="166" name="Google Shape;166;p25"/>
-          <p:cNvPicPr preferRelativeResize="0"/>
-          <p:nvPr/>
-        </p:nvPicPr>
-        <p:blipFill>
-          <a:blip r:embed="rId15">
-            <a:alphaModFix/>
-          </a:blip>
-          <a:stretch>
-            <a:fillRect/>
-          </a:stretch>
-        </p:blipFill>
-        <p:spPr>
-          <a:xfrm>
-            <a:off x="2554725" y="2667604"/>
-            <a:ext cx="200051" cy="188494"/>
-          </a:xfrm>
-          <a:prstGeom prst="rect">
-            <a:avLst/>
-          </a:prstGeom>
-          <a:noFill/>
-          <a:ln>
-            <a:noFill/>
-          </a:ln>
-        </p:spPr>
-      </p:pic>
-      <p:pic>
-        <p:nvPicPr>
-          <p:cNvPr id="167" name="Google Shape;167;p25"/>
-          <p:cNvPicPr preferRelativeResize="0"/>
-          <p:nvPr/>
-        </p:nvPicPr>
-        <p:blipFill>
-          <a:blip r:embed="rId16">
-            <a:alphaModFix/>
-          </a:blip>
-          <a:stretch>
-            <a:fillRect/>
-          </a:stretch>
-        </p:blipFill>
-        <p:spPr>
-          <a:xfrm>
-            <a:off x="6154548" y="2665200"/>
-            <a:ext cx="200049" cy="193298"/>
-          </a:xfrm>
-          <a:prstGeom prst="rect">
-            <a:avLst/>
-          </a:prstGeom>
-          <a:noFill/>
-          <a:ln>
-            <a:noFill/>
-          </a:ln>
-        </p:spPr>
-      </p:pic>
-      <p:pic>
-        <p:nvPicPr>
-          <p:cNvPr id="168" name="Google Shape;168;p25"/>
-          <p:cNvPicPr preferRelativeResize="0"/>
-          <p:nvPr/>
-        </p:nvPicPr>
-        <p:blipFill>
-          <a:blip r:embed="rId17">
-            <a:alphaModFix/>
-          </a:blip>
-          <a:stretch>
-            <a:fillRect/>
-          </a:stretch>
-        </p:blipFill>
-        <p:spPr>
-          <a:xfrm>
-            <a:off x="8553117" y="2642925"/>
-            <a:ext cx="200049" cy="198384"/>
-          </a:xfrm>
-          <a:prstGeom prst="rect">
-            <a:avLst/>
-          </a:prstGeom>
-          <a:noFill/>
-          <a:ln>
-            <a:noFill/>
-          </a:ln>
-        </p:spPr>
-      </p:pic>
-      <p:pic>
-        <p:nvPicPr>
           <p:cNvPr id="5" name="Picture 4" descr="Chart&#10;&#10;Description automatically generated">
             <a:extLst>
               <a:ext uri="{FF2B5EF4-FFF2-40B4-BE49-F238E27FC236}">
@@ -18083,7 +17889,7 @@
           <p:nvPr/>
         </p:nvPicPr>
         <p:blipFill rotWithShape="1">
-          <a:blip r:embed="rId18"/>
+          <a:blip r:embed="rId11"/>
           <a:srcRect l="7275" t="9941" r="8086" b="5366"/>
           <a:stretch/>
         </p:blipFill>
@@ -18091,6 +17897,214 @@
           <a:xfrm>
             <a:off x="357193" y="1056394"/>
             <a:ext cx="1918805" cy="1440000"/>
+          </a:xfrm>
+          <a:prstGeom prst="rect">
+            <a:avLst/>
+          </a:prstGeom>
+        </p:spPr>
+      </p:pic>
+      <p:pic>
+        <p:nvPicPr>
+          <p:cNvPr id="7" name="Picture 6" descr="Chart&#10;&#10;Description automatically generated">
+            <a:extLst>
+              <a:ext uri="{FF2B5EF4-FFF2-40B4-BE49-F238E27FC236}">
+                <a16:creationId xmlns:a16="http://schemas.microsoft.com/office/drawing/2014/main" id="{B4F24207-205D-4F4E-B775-4D26BB784687}"/>
+              </a:ext>
+            </a:extLst>
+          </p:cNvPr>
+          <p:cNvPicPr>
+            <a:picLocks noChangeAspect="1"/>
+          </p:cNvPicPr>
+          <p:nvPr/>
+        </p:nvPicPr>
+        <p:blipFill rotWithShape="1">
+          <a:blip r:embed="rId12"/>
+          <a:srcRect l="647" t="3393" r="2786" b="7465"/>
+          <a:stretch/>
+        </p:blipFill>
+        <p:spPr>
+          <a:xfrm>
+            <a:off x="6032269" y="1068191"/>
+            <a:ext cx="2747248" cy="1440000"/>
+          </a:xfrm>
+          <a:prstGeom prst="rect">
+            <a:avLst/>
+          </a:prstGeom>
+        </p:spPr>
+      </p:pic>
+      <p:pic>
+        <p:nvPicPr>
+          <p:cNvPr id="9" name="Picture 8" descr="Chart, box and whisker chart&#10;&#10;Description automatically generated">
+            <a:extLst>
+              <a:ext uri="{FF2B5EF4-FFF2-40B4-BE49-F238E27FC236}">
+                <a16:creationId xmlns:a16="http://schemas.microsoft.com/office/drawing/2014/main" id="{DB70D7E7-E904-4450-BECC-4B1761820BB6}"/>
+              </a:ext>
+            </a:extLst>
+          </p:cNvPr>
+          <p:cNvPicPr>
+            <a:picLocks noChangeAspect="1"/>
+          </p:cNvPicPr>
+          <p:nvPr/>
+        </p:nvPicPr>
+        <p:blipFill rotWithShape="1">
+          <a:blip r:embed="rId13"/>
+          <a:srcRect r="16573"/>
+          <a:stretch/>
+        </p:blipFill>
+        <p:spPr>
+          <a:xfrm>
+            <a:off x="340681" y="2897120"/>
+            <a:ext cx="852919" cy="1476000"/>
+          </a:xfrm>
+          <a:prstGeom prst="rect">
+            <a:avLst/>
+          </a:prstGeom>
+        </p:spPr>
+      </p:pic>
+      <p:pic>
+        <p:nvPicPr>
+          <p:cNvPr id="11" name="Picture 10" descr="A picture containing text, stationary, envelope, businesscard&#10;&#10;Description automatically generated">
+            <a:extLst>
+              <a:ext uri="{FF2B5EF4-FFF2-40B4-BE49-F238E27FC236}">
+                <a16:creationId xmlns:a16="http://schemas.microsoft.com/office/drawing/2014/main" id="{85B18E00-7D5B-42BA-A042-526ACE9D29E3}"/>
+              </a:ext>
+            </a:extLst>
+          </p:cNvPr>
+          <p:cNvPicPr>
+            <a:picLocks noChangeAspect="1"/>
+          </p:cNvPicPr>
+          <p:nvPr/>
+        </p:nvPicPr>
+        <p:blipFill>
+          <a:blip r:embed="rId14"/>
+          <a:stretch>
+            <a:fillRect/>
+          </a:stretch>
+        </p:blipFill>
+        <p:spPr>
+          <a:xfrm>
+            <a:off x="3816044" y="814815"/>
+            <a:ext cx="208709" cy="198000"/>
+          </a:xfrm>
+          <a:prstGeom prst="rect">
+            <a:avLst/>
+          </a:prstGeom>
+        </p:spPr>
+      </p:pic>
+      <p:pic>
+        <p:nvPicPr>
+          <p:cNvPr id="13" name="Picture 12" descr="A picture containing text, businesscard, stationary, envelope&#10;&#10;Description automatically generated">
+            <a:extLst>
+              <a:ext uri="{FF2B5EF4-FFF2-40B4-BE49-F238E27FC236}">
+                <a16:creationId xmlns:a16="http://schemas.microsoft.com/office/drawing/2014/main" id="{D7ADDFC3-0746-40DB-B5DA-E61AA4F44863}"/>
+              </a:ext>
+            </a:extLst>
+          </p:cNvPr>
+          <p:cNvPicPr>
+            <a:picLocks noChangeAspect="1"/>
+          </p:cNvPicPr>
+          <p:nvPr/>
+        </p:nvPicPr>
+        <p:blipFill>
+          <a:blip r:embed="rId15"/>
+          <a:stretch>
+            <a:fillRect/>
+          </a:stretch>
+        </p:blipFill>
+        <p:spPr>
+          <a:xfrm>
+            <a:off x="8569194" y="819296"/>
+            <a:ext cx="197160" cy="198000"/>
+          </a:xfrm>
+          <a:prstGeom prst="rect">
+            <a:avLst/>
+          </a:prstGeom>
+        </p:spPr>
+      </p:pic>
+      <p:pic>
+        <p:nvPicPr>
+          <p:cNvPr id="15" name="Picture 14" descr="A picture containing text, stationary, businesscard, envelope&#10;&#10;Description automatically generated">
+            <a:extLst>
+              <a:ext uri="{FF2B5EF4-FFF2-40B4-BE49-F238E27FC236}">
+                <a16:creationId xmlns:a16="http://schemas.microsoft.com/office/drawing/2014/main" id="{896AD878-70FE-40D8-89FE-D4F9D16D773E}"/>
+              </a:ext>
+            </a:extLst>
+          </p:cNvPr>
+          <p:cNvPicPr>
+            <a:picLocks noChangeAspect="1"/>
+          </p:cNvPicPr>
+          <p:nvPr/>
+        </p:nvPicPr>
+        <p:blipFill>
+          <a:blip r:embed="rId16"/>
+          <a:stretch>
+            <a:fillRect/>
+          </a:stretch>
+        </p:blipFill>
+        <p:spPr>
+          <a:xfrm>
+            <a:off x="2562332" y="2664555"/>
+            <a:ext cx="209605" cy="198000"/>
+          </a:xfrm>
+          <a:prstGeom prst="rect">
+            <a:avLst/>
+          </a:prstGeom>
+        </p:spPr>
+      </p:pic>
+      <p:pic>
+        <p:nvPicPr>
+          <p:cNvPr id="17" name="Picture 16" descr="Shape&#10;&#10;Description automatically generated">
+            <a:extLst>
+              <a:ext uri="{FF2B5EF4-FFF2-40B4-BE49-F238E27FC236}">
+                <a16:creationId xmlns:a16="http://schemas.microsoft.com/office/drawing/2014/main" id="{1A6AF5D0-E96D-4510-852D-C95B675B59D2}"/>
+              </a:ext>
+            </a:extLst>
+          </p:cNvPr>
+          <p:cNvPicPr>
+            <a:picLocks noChangeAspect="1"/>
+          </p:cNvPicPr>
+          <p:nvPr/>
+        </p:nvPicPr>
+        <p:blipFill>
+          <a:blip r:embed="rId17"/>
+          <a:stretch>
+            <a:fillRect/>
+          </a:stretch>
+        </p:blipFill>
+        <p:spPr>
+          <a:xfrm>
+            <a:off x="6173463" y="2666640"/>
+            <a:ext cx="203564" cy="198000"/>
+          </a:xfrm>
+          <a:prstGeom prst="rect">
+            <a:avLst/>
+          </a:prstGeom>
+        </p:spPr>
+      </p:pic>
+      <p:pic>
+        <p:nvPicPr>
+          <p:cNvPr id="19" name="Picture 18" descr="Shape&#10;&#10;Description automatically generated">
+            <a:extLst>
+              <a:ext uri="{FF2B5EF4-FFF2-40B4-BE49-F238E27FC236}">
+                <a16:creationId xmlns:a16="http://schemas.microsoft.com/office/drawing/2014/main" id="{F1F69D76-94B8-44AC-909E-E09A8EDFF20A}"/>
+              </a:ext>
+            </a:extLst>
+          </p:cNvPr>
+          <p:cNvPicPr>
+            <a:picLocks noChangeAspect="1"/>
+          </p:cNvPicPr>
+          <p:nvPr/>
+        </p:nvPicPr>
+        <p:blipFill>
+          <a:blip r:embed="rId18"/>
+          <a:stretch>
+            <a:fillRect/>
+          </a:stretch>
+        </p:blipFill>
+        <p:spPr>
+          <a:xfrm>
+            <a:off x="8565657" y="2663423"/>
+            <a:ext cx="205564" cy="198000"/>
           </a:xfrm>
           <a:prstGeom prst="rect">
             <a:avLst/>

</xml_diff>

<commit_message>
Changed nanomole box plots to include TS
</commit_message>
<xml_diff>
--- a/Poster/AI3SD Poster.pptx
+++ b/Poster/AI3SD Poster.pptx
@@ -2466,733 +2466,6 @@
 </file>
 
 <file path=ppt/slideLayouts/slideLayout13.xml><?xml version="1.0" encoding="utf-8"?>
-<p:sldLayout xmlns:a="http://schemas.openxmlformats.org/drawingml/2006/main" xmlns:r="http://schemas.openxmlformats.org/officeDocument/2006/relationships" xmlns:p="http://schemas.openxmlformats.org/presentationml/2006/main" matchingName="Title and Content" type="obj">
-  <p:cSld name="OBJECT">
-    <p:spTree>
-      <p:nvGrpSpPr>
-        <p:cNvPr id="1" name="Shape 62"/>
-        <p:cNvGrpSpPr/>
-        <p:nvPr/>
-      </p:nvGrpSpPr>
-      <p:grpSpPr>
-        <a:xfrm>
-          <a:off x="0" y="0"/>
-          <a:ext cx="0" cy="0"/>
-          <a:chOff x="0" y="0"/>
-          <a:chExt cx="0" cy="0"/>
-        </a:xfrm>
-      </p:grpSpPr>
-      <p:sp>
-        <p:nvSpPr>
-          <p:cNvPr id="63" name="Google Shape;63;p15"/>
-          <p:cNvSpPr txBox="1">
-            <a:spLocks noGrp="1"/>
-          </p:cNvSpPr>
-          <p:nvPr>
-            <p:ph type="title"/>
-          </p:nvPr>
-        </p:nvSpPr>
-        <p:spPr>
-          <a:xfrm>
-            <a:off x="628650" y="273844"/>
-            <a:ext cx="7886700" cy="994172"/>
-          </a:xfrm>
-          <a:prstGeom prst="rect">
-            <a:avLst/>
-          </a:prstGeom>
-          <a:noFill/>
-          <a:ln>
-            <a:noFill/>
-          </a:ln>
-        </p:spPr>
-        <p:txBody>
-          <a:bodyPr spcFirstLastPara="1" wrap="square" lIns="91425" tIns="45700" rIns="91425" bIns="45700" anchor="ctr" anchorCtr="0">
-            <a:normAutofit/>
-          </a:bodyPr>
-          <a:lstStyle>
-            <a:lvl1pPr lvl="0" algn="l">
-              <a:lnSpc>
-                <a:spcPct val="90000"/>
-              </a:lnSpc>
-              <a:spcBef>
-                <a:spcPts val="0"/>
-              </a:spcBef>
-              <a:spcAft>
-                <a:spcPts val="0"/>
-              </a:spcAft>
-              <a:buClr>
-                <a:schemeClr val="dk1"/>
-              </a:buClr>
-              <a:buSzPts val="1800"/>
-              <a:buNone/>
-              <a:defRPr/>
-            </a:lvl1pPr>
-            <a:lvl2pPr lvl="1">
-              <a:spcBef>
-                <a:spcPts val="0"/>
-              </a:spcBef>
-              <a:spcAft>
-                <a:spcPts val="0"/>
-              </a:spcAft>
-              <a:buSzPts val="1400"/>
-              <a:buNone/>
-              <a:defRPr/>
-            </a:lvl2pPr>
-            <a:lvl3pPr lvl="2">
-              <a:spcBef>
-                <a:spcPts val="0"/>
-              </a:spcBef>
-              <a:spcAft>
-                <a:spcPts val="0"/>
-              </a:spcAft>
-              <a:buSzPts val="1400"/>
-              <a:buNone/>
-              <a:defRPr/>
-            </a:lvl3pPr>
-            <a:lvl4pPr lvl="3">
-              <a:spcBef>
-                <a:spcPts val="0"/>
-              </a:spcBef>
-              <a:spcAft>
-                <a:spcPts val="0"/>
-              </a:spcAft>
-              <a:buSzPts val="1400"/>
-              <a:buNone/>
-              <a:defRPr/>
-            </a:lvl4pPr>
-            <a:lvl5pPr lvl="4">
-              <a:spcBef>
-                <a:spcPts val="0"/>
-              </a:spcBef>
-              <a:spcAft>
-                <a:spcPts val="0"/>
-              </a:spcAft>
-              <a:buSzPts val="1400"/>
-              <a:buNone/>
-              <a:defRPr/>
-            </a:lvl5pPr>
-            <a:lvl6pPr lvl="5">
-              <a:spcBef>
-                <a:spcPts val="0"/>
-              </a:spcBef>
-              <a:spcAft>
-                <a:spcPts val="0"/>
-              </a:spcAft>
-              <a:buSzPts val="1400"/>
-              <a:buNone/>
-              <a:defRPr/>
-            </a:lvl6pPr>
-            <a:lvl7pPr lvl="6">
-              <a:spcBef>
-                <a:spcPts val="0"/>
-              </a:spcBef>
-              <a:spcAft>
-                <a:spcPts val="0"/>
-              </a:spcAft>
-              <a:buSzPts val="1400"/>
-              <a:buNone/>
-              <a:defRPr/>
-            </a:lvl7pPr>
-            <a:lvl8pPr lvl="7">
-              <a:spcBef>
-                <a:spcPts val="0"/>
-              </a:spcBef>
-              <a:spcAft>
-                <a:spcPts val="0"/>
-              </a:spcAft>
-              <a:buSzPts val="1400"/>
-              <a:buNone/>
-              <a:defRPr/>
-            </a:lvl8pPr>
-            <a:lvl9pPr lvl="8">
-              <a:spcBef>
-                <a:spcPts val="0"/>
-              </a:spcBef>
-              <a:spcAft>
-                <a:spcPts val="0"/>
-              </a:spcAft>
-              <a:buSzPts val="1400"/>
-              <a:buNone/>
-              <a:defRPr/>
-            </a:lvl9pPr>
-          </a:lstStyle>
-          <a:p>
-            <a:endParaRPr/>
-          </a:p>
-        </p:txBody>
-      </p:sp>
-      <p:sp>
-        <p:nvSpPr>
-          <p:cNvPr id="64" name="Google Shape;64;p15"/>
-          <p:cNvSpPr txBox="1">
-            <a:spLocks noGrp="1"/>
-          </p:cNvSpPr>
-          <p:nvPr>
-            <p:ph type="body" idx="1"/>
-          </p:nvPr>
-        </p:nvSpPr>
-        <p:spPr>
-          <a:xfrm>
-            <a:off x="628650" y="1369219"/>
-            <a:ext cx="7886700" cy="3263504"/>
-          </a:xfrm>
-          <a:prstGeom prst="rect">
-            <a:avLst/>
-          </a:prstGeom>
-          <a:noFill/>
-          <a:ln>
-            <a:noFill/>
-          </a:ln>
-        </p:spPr>
-        <p:txBody>
-          <a:bodyPr spcFirstLastPara="1" wrap="square" lIns="91425" tIns="45700" rIns="91425" bIns="45700" anchor="t" anchorCtr="0">
-            <a:normAutofit/>
-          </a:bodyPr>
-          <a:lstStyle>
-            <a:lvl1pPr marL="457200" lvl="0" indent="-342900" algn="l">
-              <a:lnSpc>
-                <a:spcPct val="90000"/>
-              </a:lnSpc>
-              <a:spcBef>
-                <a:spcPts val="750"/>
-              </a:spcBef>
-              <a:spcAft>
-                <a:spcPts val="0"/>
-              </a:spcAft>
-              <a:buClr>
-                <a:schemeClr val="dk1"/>
-              </a:buClr>
-              <a:buSzPts val="1800"/>
-              <a:buChar char="•"/>
-              <a:defRPr/>
-            </a:lvl1pPr>
-            <a:lvl2pPr marL="914400" lvl="1" indent="-342900" algn="l">
-              <a:lnSpc>
-                <a:spcPct val="90000"/>
-              </a:lnSpc>
-              <a:spcBef>
-                <a:spcPts val="375"/>
-              </a:spcBef>
-              <a:spcAft>
-                <a:spcPts val="0"/>
-              </a:spcAft>
-              <a:buClr>
-                <a:schemeClr val="dk1"/>
-              </a:buClr>
-              <a:buSzPts val="1800"/>
-              <a:buChar char="•"/>
-              <a:defRPr/>
-            </a:lvl2pPr>
-            <a:lvl3pPr marL="1371600" lvl="2" indent="-342900" algn="l">
-              <a:lnSpc>
-                <a:spcPct val="90000"/>
-              </a:lnSpc>
-              <a:spcBef>
-                <a:spcPts val="375"/>
-              </a:spcBef>
-              <a:spcAft>
-                <a:spcPts val="0"/>
-              </a:spcAft>
-              <a:buClr>
-                <a:schemeClr val="dk1"/>
-              </a:buClr>
-              <a:buSzPts val="1800"/>
-              <a:buChar char="•"/>
-              <a:defRPr/>
-            </a:lvl3pPr>
-            <a:lvl4pPr marL="1828800" lvl="3" indent="-342900" algn="l">
-              <a:lnSpc>
-                <a:spcPct val="90000"/>
-              </a:lnSpc>
-              <a:spcBef>
-                <a:spcPts val="375"/>
-              </a:spcBef>
-              <a:spcAft>
-                <a:spcPts val="0"/>
-              </a:spcAft>
-              <a:buClr>
-                <a:schemeClr val="dk1"/>
-              </a:buClr>
-              <a:buSzPts val="1800"/>
-              <a:buChar char="•"/>
-              <a:defRPr/>
-            </a:lvl4pPr>
-            <a:lvl5pPr marL="2286000" lvl="4" indent="-342900" algn="l">
-              <a:lnSpc>
-                <a:spcPct val="90000"/>
-              </a:lnSpc>
-              <a:spcBef>
-                <a:spcPts val="375"/>
-              </a:spcBef>
-              <a:spcAft>
-                <a:spcPts val="0"/>
-              </a:spcAft>
-              <a:buClr>
-                <a:schemeClr val="dk1"/>
-              </a:buClr>
-              <a:buSzPts val="1800"/>
-              <a:buChar char="•"/>
-              <a:defRPr/>
-            </a:lvl5pPr>
-            <a:lvl6pPr marL="2743200" lvl="5" indent="-342900" algn="l">
-              <a:lnSpc>
-                <a:spcPct val="90000"/>
-              </a:lnSpc>
-              <a:spcBef>
-                <a:spcPts val="375"/>
-              </a:spcBef>
-              <a:spcAft>
-                <a:spcPts val="0"/>
-              </a:spcAft>
-              <a:buClr>
-                <a:schemeClr val="dk1"/>
-              </a:buClr>
-              <a:buSzPts val="1800"/>
-              <a:buChar char="•"/>
-              <a:defRPr/>
-            </a:lvl6pPr>
-            <a:lvl7pPr marL="3200400" lvl="6" indent="-342900" algn="l">
-              <a:lnSpc>
-                <a:spcPct val="90000"/>
-              </a:lnSpc>
-              <a:spcBef>
-                <a:spcPts val="375"/>
-              </a:spcBef>
-              <a:spcAft>
-                <a:spcPts val="0"/>
-              </a:spcAft>
-              <a:buClr>
-                <a:schemeClr val="dk1"/>
-              </a:buClr>
-              <a:buSzPts val="1800"/>
-              <a:buChar char="•"/>
-              <a:defRPr/>
-            </a:lvl7pPr>
-            <a:lvl8pPr marL="3657600" lvl="7" indent="-342900" algn="l">
-              <a:lnSpc>
-                <a:spcPct val="90000"/>
-              </a:lnSpc>
-              <a:spcBef>
-                <a:spcPts val="375"/>
-              </a:spcBef>
-              <a:spcAft>
-                <a:spcPts val="0"/>
-              </a:spcAft>
-              <a:buClr>
-                <a:schemeClr val="dk1"/>
-              </a:buClr>
-              <a:buSzPts val="1800"/>
-              <a:buChar char="•"/>
-              <a:defRPr/>
-            </a:lvl8pPr>
-            <a:lvl9pPr marL="4114800" lvl="8" indent="-342900" algn="l">
-              <a:lnSpc>
-                <a:spcPct val="90000"/>
-              </a:lnSpc>
-              <a:spcBef>
-                <a:spcPts val="375"/>
-              </a:spcBef>
-              <a:spcAft>
-                <a:spcPts val="0"/>
-              </a:spcAft>
-              <a:buClr>
-                <a:schemeClr val="dk1"/>
-              </a:buClr>
-              <a:buSzPts val="1800"/>
-              <a:buChar char="•"/>
-              <a:defRPr/>
-            </a:lvl9pPr>
-          </a:lstStyle>
-          <a:p>
-            <a:endParaRPr/>
-          </a:p>
-        </p:txBody>
-      </p:sp>
-      <p:sp>
-        <p:nvSpPr>
-          <p:cNvPr id="65" name="Google Shape;65;p15"/>
-          <p:cNvSpPr txBox="1">
-            <a:spLocks noGrp="1"/>
-          </p:cNvSpPr>
-          <p:nvPr>
-            <p:ph type="dt" idx="10"/>
-          </p:nvPr>
-        </p:nvSpPr>
-        <p:spPr>
-          <a:xfrm>
-            <a:off x="628650" y="4767263"/>
-            <a:ext cx="2057400" cy="273844"/>
-          </a:xfrm>
-          <a:prstGeom prst="rect">
-            <a:avLst/>
-          </a:prstGeom>
-          <a:noFill/>
-          <a:ln>
-            <a:noFill/>
-          </a:ln>
-        </p:spPr>
-        <p:txBody>
-          <a:bodyPr spcFirstLastPara="1" wrap="square" lIns="91425" tIns="45700" rIns="91425" bIns="45700" anchor="ctr" anchorCtr="0">
-            <a:noAutofit/>
-          </a:bodyPr>
-          <a:lstStyle>
-            <a:lvl1pPr lvl="0" algn="l">
-              <a:spcBef>
-                <a:spcPts val="0"/>
-              </a:spcBef>
-              <a:spcAft>
-                <a:spcPts val="0"/>
-              </a:spcAft>
-              <a:buSzPts val="1400"/>
-              <a:buNone/>
-              <a:defRPr/>
-            </a:lvl1pPr>
-            <a:lvl2pPr lvl="1" algn="l">
-              <a:spcBef>
-                <a:spcPts val="0"/>
-              </a:spcBef>
-              <a:spcAft>
-                <a:spcPts val="0"/>
-              </a:spcAft>
-              <a:buSzPts val="1400"/>
-              <a:buNone/>
-              <a:defRPr/>
-            </a:lvl2pPr>
-            <a:lvl3pPr lvl="2" algn="l">
-              <a:spcBef>
-                <a:spcPts val="0"/>
-              </a:spcBef>
-              <a:spcAft>
-                <a:spcPts val="0"/>
-              </a:spcAft>
-              <a:buSzPts val="1400"/>
-              <a:buNone/>
-              <a:defRPr/>
-            </a:lvl3pPr>
-            <a:lvl4pPr lvl="3" algn="l">
-              <a:spcBef>
-                <a:spcPts val="0"/>
-              </a:spcBef>
-              <a:spcAft>
-                <a:spcPts val="0"/>
-              </a:spcAft>
-              <a:buSzPts val="1400"/>
-              <a:buNone/>
-              <a:defRPr/>
-            </a:lvl4pPr>
-            <a:lvl5pPr lvl="4" algn="l">
-              <a:spcBef>
-                <a:spcPts val="0"/>
-              </a:spcBef>
-              <a:spcAft>
-                <a:spcPts val="0"/>
-              </a:spcAft>
-              <a:buSzPts val="1400"/>
-              <a:buNone/>
-              <a:defRPr/>
-            </a:lvl5pPr>
-            <a:lvl6pPr lvl="5" algn="l">
-              <a:spcBef>
-                <a:spcPts val="0"/>
-              </a:spcBef>
-              <a:spcAft>
-                <a:spcPts val="0"/>
-              </a:spcAft>
-              <a:buSzPts val="1400"/>
-              <a:buNone/>
-              <a:defRPr/>
-            </a:lvl6pPr>
-            <a:lvl7pPr lvl="6" algn="l">
-              <a:spcBef>
-                <a:spcPts val="0"/>
-              </a:spcBef>
-              <a:spcAft>
-                <a:spcPts val="0"/>
-              </a:spcAft>
-              <a:buSzPts val="1400"/>
-              <a:buNone/>
-              <a:defRPr/>
-            </a:lvl7pPr>
-            <a:lvl8pPr lvl="7" algn="l">
-              <a:spcBef>
-                <a:spcPts val="0"/>
-              </a:spcBef>
-              <a:spcAft>
-                <a:spcPts val="0"/>
-              </a:spcAft>
-              <a:buSzPts val="1400"/>
-              <a:buNone/>
-              <a:defRPr/>
-            </a:lvl8pPr>
-            <a:lvl9pPr lvl="8" algn="l">
-              <a:spcBef>
-                <a:spcPts val="0"/>
-              </a:spcBef>
-              <a:spcAft>
-                <a:spcPts val="0"/>
-              </a:spcAft>
-              <a:buSzPts val="1400"/>
-              <a:buNone/>
-              <a:defRPr/>
-            </a:lvl9pPr>
-          </a:lstStyle>
-          <a:p>
-            <a:endParaRPr/>
-          </a:p>
-        </p:txBody>
-      </p:sp>
-      <p:sp>
-        <p:nvSpPr>
-          <p:cNvPr id="66" name="Google Shape;66;p15"/>
-          <p:cNvSpPr txBox="1">
-            <a:spLocks noGrp="1"/>
-          </p:cNvSpPr>
-          <p:nvPr>
-            <p:ph type="ftr" idx="11"/>
-          </p:nvPr>
-        </p:nvSpPr>
-        <p:spPr>
-          <a:xfrm>
-            <a:off x="3028950" y="4767263"/>
-            <a:ext cx="3086100" cy="273844"/>
-          </a:xfrm>
-          <a:prstGeom prst="rect">
-            <a:avLst/>
-          </a:prstGeom>
-          <a:noFill/>
-          <a:ln>
-            <a:noFill/>
-          </a:ln>
-        </p:spPr>
-        <p:txBody>
-          <a:bodyPr spcFirstLastPara="1" wrap="square" lIns="91425" tIns="45700" rIns="91425" bIns="45700" anchor="ctr" anchorCtr="0">
-            <a:noAutofit/>
-          </a:bodyPr>
-          <a:lstStyle>
-            <a:lvl1pPr lvl="0" algn="ctr">
-              <a:spcBef>
-                <a:spcPts val="0"/>
-              </a:spcBef>
-              <a:spcAft>
-                <a:spcPts val="0"/>
-              </a:spcAft>
-              <a:buSzPts val="1400"/>
-              <a:buNone/>
-              <a:defRPr/>
-            </a:lvl1pPr>
-            <a:lvl2pPr lvl="1" algn="l">
-              <a:spcBef>
-                <a:spcPts val="0"/>
-              </a:spcBef>
-              <a:spcAft>
-                <a:spcPts val="0"/>
-              </a:spcAft>
-              <a:buSzPts val="1400"/>
-              <a:buNone/>
-              <a:defRPr/>
-            </a:lvl2pPr>
-            <a:lvl3pPr lvl="2" algn="l">
-              <a:spcBef>
-                <a:spcPts val="0"/>
-              </a:spcBef>
-              <a:spcAft>
-                <a:spcPts val="0"/>
-              </a:spcAft>
-              <a:buSzPts val="1400"/>
-              <a:buNone/>
-              <a:defRPr/>
-            </a:lvl3pPr>
-            <a:lvl4pPr lvl="3" algn="l">
-              <a:spcBef>
-                <a:spcPts val="0"/>
-              </a:spcBef>
-              <a:spcAft>
-                <a:spcPts val="0"/>
-              </a:spcAft>
-              <a:buSzPts val="1400"/>
-              <a:buNone/>
-              <a:defRPr/>
-            </a:lvl4pPr>
-            <a:lvl5pPr lvl="4" algn="l">
-              <a:spcBef>
-                <a:spcPts val="0"/>
-              </a:spcBef>
-              <a:spcAft>
-                <a:spcPts val="0"/>
-              </a:spcAft>
-              <a:buSzPts val="1400"/>
-              <a:buNone/>
-              <a:defRPr/>
-            </a:lvl5pPr>
-            <a:lvl6pPr lvl="5" algn="l">
-              <a:spcBef>
-                <a:spcPts val="0"/>
-              </a:spcBef>
-              <a:spcAft>
-                <a:spcPts val="0"/>
-              </a:spcAft>
-              <a:buSzPts val="1400"/>
-              <a:buNone/>
-              <a:defRPr/>
-            </a:lvl6pPr>
-            <a:lvl7pPr lvl="6" algn="l">
-              <a:spcBef>
-                <a:spcPts val="0"/>
-              </a:spcBef>
-              <a:spcAft>
-                <a:spcPts val="0"/>
-              </a:spcAft>
-              <a:buSzPts val="1400"/>
-              <a:buNone/>
-              <a:defRPr/>
-            </a:lvl7pPr>
-            <a:lvl8pPr lvl="7" algn="l">
-              <a:spcBef>
-                <a:spcPts val="0"/>
-              </a:spcBef>
-              <a:spcAft>
-                <a:spcPts val="0"/>
-              </a:spcAft>
-              <a:buSzPts val="1400"/>
-              <a:buNone/>
-              <a:defRPr/>
-            </a:lvl8pPr>
-            <a:lvl9pPr lvl="8" algn="l">
-              <a:spcBef>
-                <a:spcPts val="0"/>
-              </a:spcBef>
-              <a:spcAft>
-                <a:spcPts val="0"/>
-              </a:spcAft>
-              <a:buSzPts val="1400"/>
-              <a:buNone/>
-              <a:defRPr/>
-            </a:lvl9pPr>
-          </a:lstStyle>
-          <a:p>
-            <a:endParaRPr/>
-          </a:p>
-        </p:txBody>
-      </p:sp>
-      <p:sp>
-        <p:nvSpPr>
-          <p:cNvPr id="67" name="Google Shape;67;p15"/>
-          <p:cNvSpPr txBox="1">
-            <a:spLocks noGrp="1"/>
-          </p:cNvSpPr>
-          <p:nvPr>
-            <p:ph type="sldNum" idx="12"/>
-          </p:nvPr>
-        </p:nvSpPr>
-        <p:spPr>
-          <a:xfrm>
-            <a:off x="6457950" y="4767263"/>
-            <a:ext cx="2057400" cy="273844"/>
-          </a:xfrm>
-          <a:prstGeom prst="rect">
-            <a:avLst/>
-          </a:prstGeom>
-          <a:noFill/>
-          <a:ln>
-            <a:noFill/>
-          </a:ln>
-        </p:spPr>
-        <p:txBody>
-          <a:bodyPr spcFirstLastPara="1" wrap="square" lIns="91425" tIns="45700" rIns="91425" bIns="45700" anchor="ctr" anchorCtr="0">
-            <a:noAutofit/>
-          </a:bodyPr>
-          <a:lstStyle>
-            <a:lvl1pPr marL="0" lvl="0" indent="0" algn="r">
-              <a:spcBef>
-                <a:spcPts val="0"/>
-              </a:spcBef>
-              <a:buNone/>
-              <a:defRPr/>
-            </a:lvl1pPr>
-            <a:lvl2pPr marL="0" lvl="1" indent="0" algn="r">
-              <a:spcBef>
-                <a:spcPts val="0"/>
-              </a:spcBef>
-              <a:buNone/>
-              <a:defRPr/>
-            </a:lvl2pPr>
-            <a:lvl3pPr marL="0" lvl="2" indent="0" algn="r">
-              <a:spcBef>
-                <a:spcPts val="0"/>
-              </a:spcBef>
-              <a:buNone/>
-              <a:defRPr/>
-            </a:lvl3pPr>
-            <a:lvl4pPr marL="0" lvl="3" indent="0" algn="r">
-              <a:spcBef>
-                <a:spcPts val="0"/>
-              </a:spcBef>
-              <a:buNone/>
-              <a:defRPr/>
-            </a:lvl4pPr>
-            <a:lvl5pPr marL="0" lvl="4" indent="0" algn="r">
-              <a:spcBef>
-                <a:spcPts val="0"/>
-              </a:spcBef>
-              <a:buNone/>
-              <a:defRPr/>
-            </a:lvl5pPr>
-            <a:lvl6pPr marL="0" lvl="5" indent="0" algn="r">
-              <a:spcBef>
-                <a:spcPts val="0"/>
-              </a:spcBef>
-              <a:buNone/>
-              <a:defRPr/>
-            </a:lvl6pPr>
-            <a:lvl7pPr marL="0" lvl="6" indent="0" algn="r">
-              <a:spcBef>
-                <a:spcPts val="0"/>
-              </a:spcBef>
-              <a:buNone/>
-              <a:defRPr/>
-            </a:lvl7pPr>
-            <a:lvl8pPr marL="0" lvl="7" indent="0" algn="r">
-              <a:spcBef>
-                <a:spcPts val="0"/>
-              </a:spcBef>
-              <a:buNone/>
-              <a:defRPr/>
-            </a:lvl8pPr>
-            <a:lvl9pPr marL="0" lvl="8" indent="0" algn="r">
-              <a:spcBef>
-                <a:spcPts val="0"/>
-              </a:spcBef>
-              <a:buNone/>
-              <a:defRPr/>
-            </a:lvl9pPr>
-          </a:lstStyle>
-          <a:p>
-            <a:pPr marL="0" lvl="0" indent="0" algn="r" rtl="0">
-              <a:spcBef>
-                <a:spcPts val="0"/>
-              </a:spcBef>
-              <a:spcAft>
-                <a:spcPts val="0"/>
-              </a:spcAft>
-              <a:buNone/>
-            </a:pPr>
-            <a:fld id="{00000000-1234-1234-1234-123412341234}" type="slidenum">
-              <a:rPr lang="en"/>
-              <a:t>‹#›</a:t>
-            </a:fld>
-            <a:endParaRPr/>
-          </a:p>
-        </p:txBody>
-      </p:sp>
-    </p:spTree>
-  </p:cSld>
-  <p:clrMapOvr>
-    <a:masterClrMapping/>
-  </p:clrMapOvr>
-</p:sldLayout>
-</file>
-
-<file path=ppt/slideLayouts/slideLayout14.xml><?xml version="1.0" encoding="utf-8"?>
 <p:sldLayout xmlns:a="http://schemas.openxmlformats.org/drawingml/2006/main" xmlns:r="http://schemas.openxmlformats.org/officeDocument/2006/relationships" xmlns:p="http://schemas.openxmlformats.org/presentationml/2006/main" matchingName="Section Header" type="secHead">
   <p:cSld name="SECTION_HEADER">
     <p:spTree>
@@ -3956,7 +3229,7 @@
 </p:sldLayout>
 </file>
 
-<file path=ppt/slideLayouts/slideLayout15.xml><?xml version="1.0" encoding="utf-8"?>
+<file path=ppt/slideLayouts/slideLayout14.xml><?xml version="1.0" encoding="utf-8"?>
 <p:sldLayout xmlns:a="http://schemas.openxmlformats.org/drawingml/2006/main" xmlns:r="http://schemas.openxmlformats.org/officeDocument/2006/relationships" xmlns:p="http://schemas.openxmlformats.org/presentationml/2006/main" matchingName="Two Content" type="twoObj">
   <p:cSld name="TWO_OBJECTS">
     <p:spTree>
@@ -4870,7 +4143,7 @@
 </p:sldLayout>
 </file>
 
-<file path=ppt/slideLayouts/slideLayout16.xml><?xml version="1.0" encoding="utf-8"?>
+<file path=ppt/slideLayouts/slideLayout15.xml><?xml version="1.0" encoding="utf-8"?>
 <p:sldLayout xmlns:a="http://schemas.openxmlformats.org/drawingml/2006/main" xmlns:r="http://schemas.openxmlformats.org/officeDocument/2006/relationships" xmlns:p="http://schemas.openxmlformats.org/presentationml/2006/main" matchingName="Comparison" type="twoTxTwoObj">
   <p:cSld name="TWO_OBJECTS_WITH_TEXT">
     <p:spTree>
@@ -6158,7 +5431,7 @@
 </p:sldLayout>
 </file>
 
-<file path=ppt/slideLayouts/slideLayout17.xml><?xml version="1.0" encoding="utf-8"?>
+<file path=ppt/slideLayouts/slideLayout16.xml><?xml version="1.0" encoding="utf-8"?>
 <p:sldLayout xmlns:a="http://schemas.openxmlformats.org/drawingml/2006/main" xmlns:r="http://schemas.openxmlformats.org/officeDocument/2006/relationships" xmlns:p="http://schemas.openxmlformats.org/presentationml/2006/main" matchingName="Title Only" type="titleOnly">
   <p:cSld name="TITLE_ONLY">
     <p:spTree>
@@ -6698,7 +5971,7 @@
 </p:sldLayout>
 </file>
 
-<file path=ppt/slideLayouts/slideLayout18.xml><?xml version="1.0" encoding="utf-8"?>
+<file path=ppt/slideLayouts/slideLayout17.xml><?xml version="1.0" encoding="utf-8"?>
 <p:sldLayout xmlns:a="http://schemas.openxmlformats.org/drawingml/2006/main" xmlns:r="http://schemas.openxmlformats.org/officeDocument/2006/relationships" xmlns:p="http://schemas.openxmlformats.org/presentationml/2006/main" matchingName="Blank" type="blank">
   <p:cSld name="BLANK">
     <p:spTree>
@@ -7099,7 +6372,7 @@
 </p:sldLayout>
 </file>
 
-<file path=ppt/slideLayouts/slideLayout19.xml><?xml version="1.0" encoding="utf-8"?>
+<file path=ppt/slideLayouts/slideLayout18.xml><?xml version="1.0" encoding="utf-8"?>
 <p:sldLayout xmlns:a="http://schemas.openxmlformats.org/drawingml/2006/main" xmlns:r="http://schemas.openxmlformats.org/officeDocument/2006/relationships" xmlns:p="http://schemas.openxmlformats.org/presentationml/2006/main" matchingName="Content with Caption" type="objTx">
   <p:cSld name="OBJECT_WITH_CAPTION_TEXT">
     <p:spTree>
@@ -8014,240 +7287,7 @@
 </p:sldLayout>
 </file>
 
-<file path=ppt/slideLayouts/slideLayout2.xml><?xml version="1.0" encoding="utf-8"?>
-<p:sldLayout xmlns:a="http://schemas.openxmlformats.org/drawingml/2006/main" xmlns:r="http://schemas.openxmlformats.org/officeDocument/2006/relationships" xmlns:p="http://schemas.openxmlformats.org/presentationml/2006/main" matchingName="Section header" type="secHead">
-  <p:cSld name="SECTION_HEADER">
-    <p:spTree>
-      <p:nvGrpSpPr>
-        <p:cNvPr id="1" name="Shape 13"/>
-        <p:cNvGrpSpPr/>
-        <p:nvPr/>
-      </p:nvGrpSpPr>
-      <p:grpSpPr>
-        <a:xfrm>
-          <a:off x="0" y="0"/>
-          <a:ext cx="0" cy="0"/>
-          <a:chOff x="0" y="0"/>
-          <a:chExt cx="0" cy="0"/>
-        </a:xfrm>
-      </p:grpSpPr>
-      <p:sp>
-        <p:nvSpPr>
-          <p:cNvPr id="14" name="Google Shape;14;p3"/>
-          <p:cNvSpPr txBox="1">
-            <a:spLocks noGrp="1"/>
-          </p:cNvSpPr>
-          <p:nvPr>
-            <p:ph type="title"/>
-          </p:nvPr>
-        </p:nvSpPr>
-        <p:spPr>
-          <a:xfrm>
-            <a:off x="311700" y="2150850"/>
-            <a:ext cx="8520600" cy="841800"/>
-          </a:xfrm>
-          <a:prstGeom prst="rect">
-            <a:avLst/>
-          </a:prstGeom>
-        </p:spPr>
-        <p:txBody>
-          <a:bodyPr spcFirstLastPara="1" wrap="square" lIns="91425" tIns="91425" rIns="91425" bIns="91425" anchor="ctr" anchorCtr="0">
-            <a:normAutofit/>
-          </a:bodyPr>
-          <a:lstStyle>
-            <a:lvl1pPr lvl="0" algn="ctr">
-              <a:spcBef>
-                <a:spcPts val="0"/>
-              </a:spcBef>
-              <a:spcAft>
-                <a:spcPts val="0"/>
-              </a:spcAft>
-              <a:buSzPts val="3600"/>
-              <a:buNone/>
-              <a:defRPr sz="3600"/>
-            </a:lvl1pPr>
-            <a:lvl2pPr lvl="1" algn="ctr">
-              <a:spcBef>
-                <a:spcPts val="0"/>
-              </a:spcBef>
-              <a:spcAft>
-                <a:spcPts val="0"/>
-              </a:spcAft>
-              <a:buSzPts val="3600"/>
-              <a:buNone/>
-              <a:defRPr sz="3600"/>
-            </a:lvl2pPr>
-            <a:lvl3pPr lvl="2" algn="ctr">
-              <a:spcBef>
-                <a:spcPts val="0"/>
-              </a:spcBef>
-              <a:spcAft>
-                <a:spcPts val="0"/>
-              </a:spcAft>
-              <a:buSzPts val="3600"/>
-              <a:buNone/>
-              <a:defRPr sz="3600"/>
-            </a:lvl3pPr>
-            <a:lvl4pPr lvl="3" algn="ctr">
-              <a:spcBef>
-                <a:spcPts val="0"/>
-              </a:spcBef>
-              <a:spcAft>
-                <a:spcPts val="0"/>
-              </a:spcAft>
-              <a:buSzPts val="3600"/>
-              <a:buNone/>
-              <a:defRPr sz="3600"/>
-            </a:lvl4pPr>
-            <a:lvl5pPr lvl="4" algn="ctr">
-              <a:spcBef>
-                <a:spcPts val="0"/>
-              </a:spcBef>
-              <a:spcAft>
-                <a:spcPts val="0"/>
-              </a:spcAft>
-              <a:buSzPts val="3600"/>
-              <a:buNone/>
-              <a:defRPr sz="3600"/>
-            </a:lvl5pPr>
-            <a:lvl6pPr lvl="5" algn="ctr">
-              <a:spcBef>
-                <a:spcPts val="0"/>
-              </a:spcBef>
-              <a:spcAft>
-                <a:spcPts val="0"/>
-              </a:spcAft>
-              <a:buSzPts val="3600"/>
-              <a:buNone/>
-              <a:defRPr sz="3600"/>
-            </a:lvl6pPr>
-            <a:lvl7pPr lvl="6" algn="ctr">
-              <a:spcBef>
-                <a:spcPts val="0"/>
-              </a:spcBef>
-              <a:spcAft>
-                <a:spcPts val="0"/>
-              </a:spcAft>
-              <a:buSzPts val="3600"/>
-              <a:buNone/>
-              <a:defRPr sz="3600"/>
-            </a:lvl7pPr>
-            <a:lvl8pPr lvl="7" algn="ctr">
-              <a:spcBef>
-                <a:spcPts val="0"/>
-              </a:spcBef>
-              <a:spcAft>
-                <a:spcPts val="0"/>
-              </a:spcAft>
-              <a:buSzPts val="3600"/>
-              <a:buNone/>
-              <a:defRPr sz="3600"/>
-            </a:lvl8pPr>
-            <a:lvl9pPr lvl="8" algn="ctr">
-              <a:spcBef>
-                <a:spcPts val="0"/>
-              </a:spcBef>
-              <a:spcAft>
-                <a:spcPts val="0"/>
-              </a:spcAft>
-              <a:buSzPts val="3600"/>
-              <a:buNone/>
-              <a:defRPr sz="3600"/>
-            </a:lvl9pPr>
-          </a:lstStyle>
-          <a:p>
-            <a:endParaRPr/>
-          </a:p>
-        </p:txBody>
-      </p:sp>
-      <p:sp>
-        <p:nvSpPr>
-          <p:cNvPr id="15" name="Google Shape;15;p3"/>
-          <p:cNvSpPr txBox="1">
-            <a:spLocks noGrp="1"/>
-          </p:cNvSpPr>
-          <p:nvPr>
-            <p:ph type="sldNum" idx="12"/>
-          </p:nvPr>
-        </p:nvSpPr>
-        <p:spPr>
-          <a:xfrm>
-            <a:off x="8472458" y="4663217"/>
-            <a:ext cx="548700" cy="393600"/>
-          </a:xfrm>
-          <a:prstGeom prst="rect">
-            <a:avLst/>
-          </a:prstGeom>
-        </p:spPr>
-        <p:txBody>
-          <a:bodyPr spcFirstLastPara="1" wrap="square" lIns="91425" tIns="91425" rIns="91425" bIns="91425" anchor="ctr" anchorCtr="0">
-            <a:normAutofit/>
-          </a:bodyPr>
-          <a:lstStyle>
-            <a:lvl1pPr lvl="0">
-              <a:buNone/>
-              <a:defRPr/>
-            </a:lvl1pPr>
-            <a:lvl2pPr lvl="1">
-              <a:buNone/>
-              <a:defRPr/>
-            </a:lvl2pPr>
-            <a:lvl3pPr lvl="2">
-              <a:buNone/>
-              <a:defRPr/>
-            </a:lvl3pPr>
-            <a:lvl4pPr lvl="3">
-              <a:buNone/>
-              <a:defRPr/>
-            </a:lvl4pPr>
-            <a:lvl5pPr lvl="4">
-              <a:buNone/>
-              <a:defRPr/>
-            </a:lvl5pPr>
-            <a:lvl6pPr lvl="5">
-              <a:buNone/>
-              <a:defRPr/>
-            </a:lvl6pPr>
-            <a:lvl7pPr lvl="6">
-              <a:buNone/>
-              <a:defRPr/>
-            </a:lvl7pPr>
-            <a:lvl8pPr lvl="7">
-              <a:buNone/>
-              <a:defRPr/>
-            </a:lvl8pPr>
-            <a:lvl9pPr lvl="8">
-              <a:buNone/>
-              <a:defRPr/>
-            </a:lvl9pPr>
-          </a:lstStyle>
-          <a:p>
-            <a:pPr marL="0" lvl="0" indent="0" algn="r" rtl="0">
-              <a:spcBef>
-                <a:spcPts val="0"/>
-              </a:spcBef>
-              <a:spcAft>
-                <a:spcPts val="0"/>
-              </a:spcAft>
-              <a:buNone/>
-            </a:pPr>
-            <a:fld id="{00000000-1234-1234-1234-123412341234}" type="slidenum">
-              <a:rPr lang="en"/>
-              <a:t>‹#›</a:t>
-            </a:fld>
-            <a:endParaRPr/>
-          </a:p>
-        </p:txBody>
-      </p:sp>
-    </p:spTree>
-  </p:cSld>
-  <p:clrMapOvr>
-    <a:masterClrMapping/>
-  </p:clrMapOvr>
-</p:sldLayout>
-</file>
-
-<file path=ppt/slideLayouts/slideLayout20.xml><?xml version="1.0" encoding="utf-8"?>
+<file path=ppt/slideLayouts/slideLayout19.xml><?xml version="1.0" encoding="utf-8"?>
 <p:sldLayout xmlns:a="http://schemas.openxmlformats.org/drawingml/2006/main" xmlns:r="http://schemas.openxmlformats.org/officeDocument/2006/relationships" xmlns:p="http://schemas.openxmlformats.org/presentationml/2006/main" matchingName="Picture with Caption" type="picTx">
   <p:cSld name="PICTURE_WITH_CAPTION_TEXT">
     <p:spTree>
@@ -8999,7 +8039,240 @@
 </p:sldLayout>
 </file>
 
-<file path=ppt/slideLayouts/slideLayout21.xml><?xml version="1.0" encoding="utf-8"?>
+<file path=ppt/slideLayouts/slideLayout2.xml><?xml version="1.0" encoding="utf-8"?>
+<p:sldLayout xmlns:a="http://schemas.openxmlformats.org/drawingml/2006/main" xmlns:r="http://schemas.openxmlformats.org/officeDocument/2006/relationships" xmlns:p="http://schemas.openxmlformats.org/presentationml/2006/main" matchingName="Section header" type="secHead">
+  <p:cSld name="SECTION_HEADER">
+    <p:spTree>
+      <p:nvGrpSpPr>
+        <p:cNvPr id="1" name="Shape 13"/>
+        <p:cNvGrpSpPr/>
+        <p:nvPr/>
+      </p:nvGrpSpPr>
+      <p:grpSpPr>
+        <a:xfrm>
+          <a:off x="0" y="0"/>
+          <a:ext cx="0" cy="0"/>
+          <a:chOff x="0" y="0"/>
+          <a:chExt cx="0" cy="0"/>
+        </a:xfrm>
+      </p:grpSpPr>
+      <p:sp>
+        <p:nvSpPr>
+          <p:cNvPr id="14" name="Google Shape;14;p3"/>
+          <p:cNvSpPr txBox="1">
+            <a:spLocks noGrp="1"/>
+          </p:cNvSpPr>
+          <p:nvPr>
+            <p:ph type="title"/>
+          </p:nvPr>
+        </p:nvSpPr>
+        <p:spPr>
+          <a:xfrm>
+            <a:off x="311700" y="2150850"/>
+            <a:ext cx="8520600" cy="841800"/>
+          </a:xfrm>
+          <a:prstGeom prst="rect">
+            <a:avLst/>
+          </a:prstGeom>
+        </p:spPr>
+        <p:txBody>
+          <a:bodyPr spcFirstLastPara="1" wrap="square" lIns="91425" tIns="91425" rIns="91425" bIns="91425" anchor="ctr" anchorCtr="0">
+            <a:normAutofit/>
+          </a:bodyPr>
+          <a:lstStyle>
+            <a:lvl1pPr lvl="0" algn="ctr">
+              <a:spcBef>
+                <a:spcPts val="0"/>
+              </a:spcBef>
+              <a:spcAft>
+                <a:spcPts val="0"/>
+              </a:spcAft>
+              <a:buSzPts val="3600"/>
+              <a:buNone/>
+              <a:defRPr sz="3600"/>
+            </a:lvl1pPr>
+            <a:lvl2pPr lvl="1" algn="ctr">
+              <a:spcBef>
+                <a:spcPts val="0"/>
+              </a:spcBef>
+              <a:spcAft>
+                <a:spcPts val="0"/>
+              </a:spcAft>
+              <a:buSzPts val="3600"/>
+              <a:buNone/>
+              <a:defRPr sz="3600"/>
+            </a:lvl2pPr>
+            <a:lvl3pPr lvl="2" algn="ctr">
+              <a:spcBef>
+                <a:spcPts val="0"/>
+              </a:spcBef>
+              <a:spcAft>
+                <a:spcPts val="0"/>
+              </a:spcAft>
+              <a:buSzPts val="3600"/>
+              <a:buNone/>
+              <a:defRPr sz="3600"/>
+            </a:lvl3pPr>
+            <a:lvl4pPr lvl="3" algn="ctr">
+              <a:spcBef>
+                <a:spcPts val="0"/>
+              </a:spcBef>
+              <a:spcAft>
+                <a:spcPts val="0"/>
+              </a:spcAft>
+              <a:buSzPts val="3600"/>
+              <a:buNone/>
+              <a:defRPr sz="3600"/>
+            </a:lvl4pPr>
+            <a:lvl5pPr lvl="4" algn="ctr">
+              <a:spcBef>
+                <a:spcPts val="0"/>
+              </a:spcBef>
+              <a:spcAft>
+                <a:spcPts val="0"/>
+              </a:spcAft>
+              <a:buSzPts val="3600"/>
+              <a:buNone/>
+              <a:defRPr sz="3600"/>
+            </a:lvl5pPr>
+            <a:lvl6pPr lvl="5" algn="ctr">
+              <a:spcBef>
+                <a:spcPts val="0"/>
+              </a:spcBef>
+              <a:spcAft>
+                <a:spcPts val="0"/>
+              </a:spcAft>
+              <a:buSzPts val="3600"/>
+              <a:buNone/>
+              <a:defRPr sz="3600"/>
+            </a:lvl6pPr>
+            <a:lvl7pPr lvl="6" algn="ctr">
+              <a:spcBef>
+                <a:spcPts val="0"/>
+              </a:spcBef>
+              <a:spcAft>
+                <a:spcPts val="0"/>
+              </a:spcAft>
+              <a:buSzPts val="3600"/>
+              <a:buNone/>
+              <a:defRPr sz="3600"/>
+            </a:lvl7pPr>
+            <a:lvl8pPr lvl="7" algn="ctr">
+              <a:spcBef>
+                <a:spcPts val="0"/>
+              </a:spcBef>
+              <a:spcAft>
+                <a:spcPts val="0"/>
+              </a:spcAft>
+              <a:buSzPts val="3600"/>
+              <a:buNone/>
+              <a:defRPr sz="3600"/>
+            </a:lvl8pPr>
+            <a:lvl9pPr lvl="8" algn="ctr">
+              <a:spcBef>
+                <a:spcPts val="0"/>
+              </a:spcBef>
+              <a:spcAft>
+                <a:spcPts val="0"/>
+              </a:spcAft>
+              <a:buSzPts val="3600"/>
+              <a:buNone/>
+              <a:defRPr sz="3600"/>
+            </a:lvl9pPr>
+          </a:lstStyle>
+          <a:p>
+            <a:endParaRPr/>
+          </a:p>
+        </p:txBody>
+      </p:sp>
+      <p:sp>
+        <p:nvSpPr>
+          <p:cNvPr id="15" name="Google Shape;15;p3"/>
+          <p:cNvSpPr txBox="1">
+            <a:spLocks noGrp="1"/>
+          </p:cNvSpPr>
+          <p:nvPr>
+            <p:ph type="sldNum" idx="12"/>
+          </p:nvPr>
+        </p:nvSpPr>
+        <p:spPr>
+          <a:xfrm>
+            <a:off x="8472458" y="4663217"/>
+            <a:ext cx="548700" cy="393600"/>
+          </a:xfrm>
+          <a:prstGeom prst="rect">
+            <a:avLst/>
+          </a:prstGeom>
+        </p:spPr>
+        <p:txBody>
+          <a:bodyPr spcFirstLastPara="1" wrap="square" lIns="91425" tIns="91425" rIns="91425" bIns="91425" anchor="ctr" anchorCtr="0">
+            <a:normAutofit/>
+          </a:bodyPr>
+          <a:lstStyle>
+            <a:lvl1pPr lvl="0">
+              <a:buNone/>
+              <a:defRPr/>
+            </a:lvl1pPr>
+            <a:lvl2pPr lvl="1">
+              <a:buNone/>
+              <a:defRPr/>
+            </a:lvl2pPr>
+            <a:lvl3pPr lvl="2">
+              <a:buNone/>
+              <a:defRPr/>
+            </a:lvl3pPr>
+            <a:lvl4pPr lvl="3">
+              <a:buNone/>
+              <a:defRPr/>
+            </a:lvl4pPr>
+            <a:lvl5pPr lvl="4">
+              <a:buNone/>
+              <a:defRPr/>
+            </a:lvl5pPr>
+            <a:lvl6pPr lvl="5">
+              <a:buNone/>
+              <a:defRPr/>
+            </a:lvl6pPr>
+            <a:lvl7pPr lvl="6">
+              <a:buNone/>
+              <a:defRPr/>
+            </a:lvl7pPr>
+            <a:lvl8pPr lvl="7">
+              <a:buNone/>
+              <a:defRPr/>
+            </a:lvl8pPr>
+            <a:lvl9pPr lvl="8">
+              <a:buNone/>
+              <a:defRPr/>
+            </a:lvl9pPr>
+          </a:lstStyle>
+          <a:p>
+            <a:pPr marL="0" lvl="0" indent="0" algn="r" rtl="0">
+              <a:spcBef>
+                <a:spcPts val="0"/>
+              </a:spcBef>
+              <a:spcAft>
+                <a:spcPts val="0"/>
+              </a:spcAft>
+              <a:buNone/>
+            </a:pPr>
+            <a:fld id="{00000000-1234-1234-1234-123412341234}" type="slidenum">
+              <a:rPr lang="en"/>
+              <a:t>‹#›</a:t>
+            </a:fld>
+            <a:endParaRPr/>
+          </a:p>
+        </p:txBody>
+      </p:sp>
+    </p:spTree>
+  </p:cSld>
+  <p:clrMapOvr>
+    <a:masterClrMapping/>
+  </p:clrMapOvr>
+</p:sldLayout>
+</file>
+
+<file path=ppt/slideLayouts/slideLayout20.xml><?xml version="1.0" encoding="utf-8"?>
 <p:sldLayout xmlns:a="http://schemas.openxmlformats.org/drawingml/2006/main" xmlns:r="http://schemas.openxmlformats.org/officeDocument/2006/relationships" xmlns:p="http://schemas.openxmlformats.org/presentationml/2006/main" matchingName="Title and Vertical Text" type="vertTx">
   <p:cSld name="VERTICAL_TEXT">
     <p:spTree>
@@ -9726,7 +8999,7 @@
 </p:sldLayout>
 </file>
 
-<file path=ppt/slideLayouts/slideLayout22.xml><?xml version="1.0" encoding="utf-8"?>
+<file path=ppt/slideLayouts/slideLayout21.xml><?xml version="1.0" encoding="utf-8"?>
 <p:sldLayout xmlns:a="http://schemas.openxmlformats.org/drawingml/2006/main" xmlns:r="http://schemas.openxmlformats.org/officeDocument/2006/relationships" xmlns:p="http://schemas.openxmlformats.org/presentationml/2006/main" matchingName="Vertical Title and Text" type="vertTitleAndTx">
   <p:cSld name="VERTICAL_TITLE_AND_VERTICAL_TEXT">
     <p:spTree>
@@ -15152,16 +14425,15 @@
   <p:clrMap bg1="lt1" tx1="dk1" bg2="dk2" tx2="lt2" accent1="accent1" accent2="accent2" accent3="accent3" accent4="accent4" accent5="accent5" accent6="accent6" hlink="hlink" folHlink="folHlink"/>
   <p:sldLayoutIdLst>
     <p:sldLayoutId id="2147483659" r:id="rId1"/>
-    <p:sldLayoutId id="2147483660" r:id="rId2"/>
-    <p:sldLayoutId id="2147483661" r:id="rId3"/>
-    <p:sldLayoutId id="2147483662" r:id="rId4"/>
-    <p:sldLayoutId id="2147483663" r:id="rId5"/>
-    <p:sldLayoutId id="2147483664" r:id="rId6"/>
-    <p:sldLayoutId id="2147483665" r:id="rId7"/>
-    <p:sldLayoutId id="2147483666" r:id="rId8"/>
-    <p:sldLayoutId id="2147483667" r:id="rId9"/>
-    <p:sldLayoutId id="2147483668" r:id="rId10"/>
-    <p:sldLayoutId id="2147483669" r:id="rId11"/>
+    <p:sldLayoutId id="2147483661" r:id="rId2"/>
+    <p:sldLayoutId id="2147483662" r:id="rId3"/>
+    <p:sldLayoutId id="2147483663" r:id="rId4"/>
+    <p:sldLayoutId id="2147483664" r:id="rId5"/>
+    <p:sldLayoutId id="2147483665" r:id="rId6"/>
+    <p:sldLayoutId id="2147483666" r:id="rId7"/>
+    <p:sldLayoutId id="2147483667" r:id="rId8"/>
+    <p:sldLayoutId id="2147483668" r:id="rId9"/>
+    <p:sldLayoutId id="2147483669" r:id="rId10"/>
   </p:sldLayoutIdLst>
   <p:hf sldNum="0" hdr="0" ftr="0" dt="0"/>
   <p:txStyles>
@@ -16012,8 +15284,8 @@
         </p:nvSpPr>
         <p:spPr>
           <a:xfrm>
-            <a:off x="873840" y="-18374"/>
-            <a:ext cx="2412840" cy="692497"/>
+            <a:off x="-91440" y="-18374"/>
+            <a:ext cx="5329488" cy="692457"/>
           </a:xfrm>
           <a:prstGeom prst="rect">
             <a:avLst/>
@@ -16039,7 +15311,7 @@
               <a:buNone/>
             </a:pPr>
             <a:r>
-              <a:rPr lang="en" sz="1800" b="1" i="0" u="none" strike="noStrike" cap="none">
+              <a:rPr lang="en" sz="1800" b="1" i="0" u="none" strike="noStrike" cap="none" dirty="0">
                 <a:solidFill>
                   <a:schemeClr val="lt1"/>
                 </a:solidFill>
@@ -16048,9 +15320,9 @@
                 <a:cs typeface="Tahoma"/>
                 <a:sym typeface="Tahoma"/>
               </a:rPr>
-              <a:t>&lt;&lt;Poster Title&gt;&gt;</a:t>
+              <a:t>Bayesian optimisation in Chemistry</a:t>
             </a:r>
-            <a:endParaRPr/>
+            <a:endParaRPr dirty="0"/>
           </a:p>
           <a:p>
             <a:pPr marL="0" marR="0" lvl="0" indent="0" algn="ctr" rtl="0">
@@ -16063,7 +15335,7 @@
               <a:buNone/>
             </a:pPr>
             <a:r>
-              <a:rPr lang="en" sz="1050" b="1" i="0" u="none" strike="noStrike" cap="none">
+              <a:rPr lang="en" sz="1050" b="1" i="0" u="none" strike="noStrike" cap="none" dirty="0">
                 <a:solidFill>
                   <a:schemeClr val="lt1"/>
                 </a:solidFill>
@@ -16072,9 +15344,9 @@
                 <a:cs typeface="Tahoma"/>
                 <a:sym typeface="Tahoma"/>
               </a:rPr>
-              <a:t>&lt;&lt;Poster Author &amp; Affiliation&gt;&gt;</a:t>
+              <a:t>Rubaiyat Khondaker, Department of Mathematics, University of Cambridge</a:t>
             </a:r>
-            <a:endParaRPr/>
+            <a:endParaRPr dirty="0"/>
           </a:p>
           <a:p>
             <a:pPr marL="0" marR="0" lvl="0" indent="0" algn="ctr" rtl="0">
@@ -16087,7 +15359,7 @@
               <a:buNone/>
             </a:pPr>
             <a:r>
-              <a:rPr lang="en" sz="1050" b="1" i="0" u="none" strike="noStrike" cap="none">
+              <a:rPr lang="en" sz="1050" b="1" i="0" u="none" strike="noStrike" cap="none" dirty="0">
                 <a:solidFill>
                   <a:schemeClr val="lt1"/>
                 </a:solidFill>
@@ -16096,9 +15368,9 @@
                 <a:cs typeface="Tahoma"/>
                 <a:sym typeface="Tahoma"/>
               </a:rPr>
-              <a:t>&lt;&lt;Email Address&gt;</a:t>
+              <a:t>rmk47@cam.ac.uk</a:t>
             </a:r>
-            <a:endParaRPr/>
+            <a:endParaRPr dirty="0"/>
           </a:p>
         </p:txBody>
       </p:sp>
@@ -16367,9 +15639,9 @@
         <p:grpSpPr>
           <a:xfrm>
             <a:off x="341824" y="2623113"/>
-            <a:ext cx="2519872" cy="1754537"/>
+            <a:ext cx="2574736" cy="1763533"/>
             <a:chOff x="344424" y="2615101"/>
-            <a:chExt cx="2519872" cy="1754537"/>
+            <a:chExt cx="2574736" cy="1763533"/>
           </a:xfrm>
         </p:grpSpPr>
         <p:sp>
@@ -16492,8 +15764,8 @@
           </p:nvSpPr>
           <p:spPr>
             <a:xfrm>
-              <a:off x="1063497" y="2830796"/>
-              <a:ext cx="1800799" cy="1538842"/>
+              <a:off x="1118361" y="2855180"/>
+              <a:ext cx="1800799" cy="1523454"/>
             </a:xfrm>
             <a:prstGeom prst="rect">
               <a:avLst/>
@@ -16519,12 +15791,21 @@
                   <a:cs typeface="Calibri"/>
                   <a:sym typeface="Calibri"/>
                 </a:rPr>
-                <a:t>Organic photovoltaic data tabulating molecular structures and power conversion efficiency. Global max c. 11.1%. EI took ~ 4 times as long as TS, but produced similar results.</a:t>
+                <a:t>Organic photovoltaic data tabulating molecular structures and power conversion efficiency. Global max c. 11.1%. EI took ~ 4 times as long as TS, but produced similar results. Optimiser only given molecular structure!</a:t>
               </a:r>
+              <a:endParaRPr lang="en" sz="600" dirty="0">
+                <a:solidFill>
+                  <a:schemeClr val="dk1"/>
+                </a:solidFill>
+                <a:effectLst/>
+                <a:latin typeface="Calibri"/>
+                <a:cs typeface="Calibri"/>
+                <a:sym typeface="Calibri"/>
+              </a:endParaRPr>
             </a:p>
             <a:p>
               <a:r>
-                <a:rPr lang="en" sz="500" dirty="0">
+                <a:rPr lang="en" sz="600" dirty="0">
                   <a:solidFill>
                     <a:schemeClr val="dk1"/>
                   </a:solidFill>
@@ -16536,79 +15817,38 @@
                 <a:t>Reference: </a:t>
               </a:r>
               <a:r>
-                <a:rPr lang="en-GB" sz="500" dirty="0" err="1">
+                <a:rPr lang="en-GB" sz="600" dirty="0">
+                  <a:solidFill>
+                    <a:schemeClr val="dk1"/>
+                  </a:solidFill>
+                  <a:effectLst/>
+                  <a:latin typeface="Calibri"/>
+                  <a:cs typeface="Calibri"/>
+                  <a:sym typeface="Calibri"/>
+                </a:rPr>
+                <a:t>The Harvard Clean Energy Project: Large-Scale Computational Screening and Design of Organic Photovoltaics on the World Community Grid,</a:t>
+              </a:r>
+              <a:r>
+                <a:rPr lang="en" sz="600" dirty="0">
+                  <a:solidFill>
+                    <a:schemeClr val="dk1"/>
+                  </a:solidFill>
+                  <a:effectLst/>
+                  <a:latin typeface="Calibri"/>
+                  <a:cs typeface="Calibri"/>
+                  <a:sym typeface="Calibri"/>
+                </a:rPr>
+                <a:t> </a:t>
+              </a:r>
+              <a:r>
+                <a:rPr lang="en-GB" sz="600" dirty="0">
                   <a:effectLst/>
                   <a:latin typeface="Calibri" panose="020F0502020204030204" pitchFamily="34" charset="0"/>
                   <a:cs typeface="Calibri" panose="020F0502020204030204" pitchFamily="34" charset="0"/>
                 </a:rPr>
-                <a:t>Hachmann</a:t>
+                <a:t>Journal of Physical Chemistry Letters, 2011, 2, 2241–2251.</a:t>
               </a:r>
-              <a:r>
-                <a:rPr lang="en-GB" sz="500" dirty="0">
-                  <a:effectLst/>
-                  <a:latin typeface="Calibri" panose="020F0502020204030204" pitchFamily="34" charset="0"/>
-                  <a:cs typeface="Calibri" panose="020F0502020204030204" pitchFamily="34" charset="0"/>
-                </a:rPr>
-                <a:t>, J., Olivares-Amaya, R., </a:t>
-              </a:r>
-              <a:r>
-                <a:rPr lang="en-GB" sz="500" dirty="0" err="1">
-                  <a:effectLst/>
-                  <a:latin typeface="Calibri" panose="020F0502020204030204" pitchFamily="34" charset="0"/>
-                  <a:cs typeface="Calibri" panose="020F0502020204030204" pitchFamily="34" charset="0"/>
-                </a:rPr>
-                <a:t>Atahan-Evrenk</a:t>
-              </a:r>
-              <a:r>
-                <a:rPr lang="en-GB" sz="500" dirty="0">
-                  <a:effectLst/>
-                  <a:latin typeface="Calibri" panose="020F0502020204030204" pitchFamily="34" charset="0"/>
-                  <a:cs typeface="Calibri" panose="020F0502020204030204" pitchFamily="34" charset="0"/>
-                </a:rPr>
-                <a:t>, S., Amador-</a:t>
-              </a:r>
-              <a:r>
-                <a:rPr lang="en-GB" sz="500" dirty="0" err="1">
-                  <a:effectLst/>
-                  <a:latin typeface="Calibri" panose="020F0502020204030204" pitchFamily="34" charset="0"/>
-                  <a:cs typeface="Calibri" panose="020F0502020204030204" pitchFamily="34" charset="0"/>
-                </a:rPr>
-                <a:t>Bedolla</a:t>
-              </a:r>
-              <a:r>
-                <a:rPr lang="en-GB" sz="500" dirty="0">
-                  <a:effectLst/>
-                  <a:latin typeface="Calibri" panose="020F0502020204030204" pitchFamily="34" charset="0"/>
-                  <a:cs typeface="Calibri" panose="020F0502020204030204" pitchFamily="34" charset="0"/>
-                </a:rPr>
-                <a:t>, C., Sánchez-Carrera, R.S., Gold-Parker, A., Vogt, L., Brockway, A.M., </a:t>
-              </a:r>
-              <a:r>
-                <a:rPr lang="en-GB" sz="500" dirty="0" err="1">
-                  <a:effectLst/>
-                  <a:latin typeface="Calibri" panose="020F0502020204030204" pitchFamily="34" charset="0"/>
-                  <a:cs typeface="Calibri" panose="020F0502020204030204" pitchFamily="34" charset="0"/>
-                </a:rPr>
-                <a:t>Aspuru-Guzik</a:t>
-              </a:r>
-              <a:r>
-                <a:rPr lang="en-GB" sz="500" dirty="0">
-                  <a:effectLst/>
-                  <a:latin typeface="Calibri" panose="020F0502020204030204" pitchFamily="34" charset="0"/>
-                  <a:cs typeface="Calibri" panose="020F0502020204030204" pitchFamily="34" charset="0"/>
-                </a:rPr>
-                <a:t>, A., 2011. The Harvard Clean Energy Project: Large-Scale Computational Screening and Design of Organic Photovoltaics on the World Community Grid. J. Phys. Chem. Lett. 2, 2241–2251. </a:t>
-              </a:r>
-              <a:r>
-                <a:rPr lang="en-GB" sz="500" dirty="0">
-                  <a:effectLst/>
-                  <a:latin typeface="Calibri" panose="020F0502020204030204" pitchFamily="34" charset="0"/>
-                  <a:cs typeface="Calibri" panose="020F0502020204030204" pitchFamily="34" charset="0"/>
-                  <a:hlinkClick r:id="rId7"/>
-                </a:rPr>
-                <a:t>https://doi.org/10.1021/jz200866s</a:t>
-              </a:r>
-              <a:endParaRPr lang="en" sz="500" dirty="0">
+              <a:endParaRPr lang="en" sz="600" dirty="0">
                 <a:solidFill>
                   <a:schemeClr val="dk1"/>
                 </a:solidFill>
@@ -16616,21 +15856,6 @@
                 <a:ea typeface="Calibri"/>
                 <a:cs typeface="Calibri" panose="020F0502020204030204" pitchFamily="34" charset="0"/>
                 <a:sym typeface="Calibri"/>
-              </a:endParaRPr>
-            </a:p>
-            <a:p>
-              <a:pPr marL="0" marR="0" lvl="0" indent="0" algn="l" rtl="0">
-                <a:spcBef>
-                  <a:spcPts val="0"/>
-                </a:spcBef>
-                <a:spcAft>
-                  <a:spcPts val="0"/>
-                </a:spcAft>
-                <a:buNone/>
-              </a:pPr>
-              <a:endParaRPr sz="500" dirty="0">
-                <a:latin typeface="Calibri" panose="020F0502020204030204" pitchFamily="34" charset="0"/>
-                <a:cs typeface="Calibri" panose="020F0502020204030204" pitchFamily="34" charset="0"/>
               </a:endParaRPr>
             </a:p>
           </p:txBody>
@@ -16644,10 +15869,10 @@
         </p:nvGrpSpPr>
         <p:grpSpPr>
           <a:xfrm>
-            <a:off x="2889692" y="2629925"/>
-            <a:ext cx="3607839" cy="1956025"/>
-            <a:chOff x="2888492" y="2615175"/>
-            <a:chExt cx="3607839" cy="1956025"/>
+            <a:off x="2913550" y="2629925"/>
+            <a:ext cx="3505092" cy="1728000"/>
+            <a:chOff x="2912350" y="2615175"/>
+            <a:chExt cx="3505092" cy="1728000"/>
           </a:xfrm>
         </p:grpSpPr>
         <p:sp>
@@ -16704,33 +15929,6 @@
             </a:p>
           </p:txBody>
         </p:sp>
-        <p:pic>
-          <p:nvPicPr>
-            <p:cNvPr id="147" name="Google Shape;147;p25" descr="Chart&#10;&#10;Description automatically generated"/>
-            <p:cNvPicPr preferRelativeResize="0"/>
-            <p:nvPr/>
-          </p:nvPicPr>
-          <p:blipFill rotWithShape="1">
-            <a:blip r:embed="rId8">
-              <a:alphaModFix/>
-            </a:blip>
-            <a:srcRect r="7208"/>
-            <a:stretch/>
-          </p:blipFill>
-          <p:spPr>
-            <a:xfrm>
-              <a:off x="2888492" y="2859778"/>
-              <a:ext cx="1875190" cy="1453925"/>
-            </a:xfrm>
-            <a:prstGeom prst="rect">
-              <a:avLst/>
-            </a:prstGeom>
-            <a:noFill/>
-            <a:ln>
-              <a:noFill/>
-            </a:ln>
-          </p:spPr>
-        </p:pic>
         <p:sp>
           <p:nvSpPr>
             <p:cNvPr id="148" name="Google Shape;148;p25"/>
@@ -16739,8 +15937,8 @@
           </p:nvSpPr>
           <p:spPr>
             <a:xfrm>
-              <a:off x="4686066" y="2816914"/>
-              <a:ext cx="1810265" cy="1754286"/>
+              <a:off x="4563408" y="2866730"/>
+              <a:ext cx="1854034" cy="1415732"/>
             </a:xfrm>
             <a:prstGeom prst="rect">
               <a:avLst/>
@@ -16766,7 +15964,7 @@
                   <a:cs typeface="Calibri" panose="020F0502020204030204" pitchFamily="34" charset="0"/>
                   <a:sym typeface="Calibri"/>
                 </a:rPr>
-                <a:t>Optimising Area Count (LC-MS). Initial domain had “holes” due to disallowed combinations, so gave 0 as default.</a:t>
+                <a:t>Optimising Area Count (LC-MS). Initial domain had “holes” due to disallowed combinations, so coded 0 as default.</a:t>
               </a:r>
               <a:r>
                 <a:rPr lang="en-GB" sz="900" dirty="0">
@@ -16791,188 +15989,13 @@
             </a:p>
             <a:p>
               <a:r>
-                <a:rPr lang="en-GB" sz="500" dirty="0">
-                  <a:solidFill>
-                    <a:schemeClr val="dk1"/>
-                  </a:solidFill>
-                  <a:latin typeface="Calibri" panose="020F0502020204030204" pitchFamily="34" charset="0"/>
-                  <a:cs typeface="Calibri" panose="020F0502020204030204" pitchFamily="34" charset="0"/>
-                  <a:sym typeface="Calibri"/>
-                </a:rPr>
-                <a:t>Reference: </a:t>
-              </a:r>
-              <a:r>
-                <a:rPr lang="en-GB" sz="500" dirty="0">
-                  <a:effectLst/>
+                <a:rPr lang="en-GB" sz="600" dirty="0">
                   <a:latin typeface="Calibri" panose="020F0502020204030204" pitchFamily="34" charset="0"/>
                   <a:cs typeface="Calibri" panose="020F0502020204030204" pitchFamily="34" charset="0"/>
                 </a:rPr>
-                <a:t>(1)  </a:t>
+                <a:t>Reference: Nanomole-scale high-throughput chemistry for the synthesis of complex molecules, Science, 2015, 347 (6217), 49-53</a:t>
               </a:r>
-              <a:r>
-                <a:rPr lang="en-GB" sz="500" dirty="0" err="1">
-                  <a:effectLst/>
-                  <a:latin typeface="Calibri" panose="020F0502020204030204" pitchFamily="34" charset="0"/>
-                  <a:cs typeface="Calibri" panose="020F0502020204030204" pitchFamily="34" charset="0"/>
-                </a:rPr>
-                <a:t>Santanilla</a:t>
-              </a:r>
-              <a:r>
-                <a:rPr lang="en-GB" sz="500" dirty="0">
-                  <a:effectLst/>
-                  <a:latin typeface="Calibri" panose="020F0502020204030204" pitchFamily="34" charset="0"/>
-                  <a:cs typeface="Calibri" panose="020F0502020204030204" pitchFamily="34" charset="0"/>
-                </a:rPr>
-                <a:t>, A. B.; Regalado, E. L.; Pereira, T.; Shevlin, M.; Bateman, K.; Campeau, L.-C.; </a:t>
-              </a:r>
-              <a:r>
-                <a:rPr lang="en-GB" sz="500" dirty="0" err="1">
-                  <a:effectLst/>
-                  <a:latin typeface="Calibri" panose="020F0502020204030204" pitchFamily="34" charset="0"/>
-                  <a:cs typeface="Calibri" panose="020F0502020204030204" pitchFamily="34" charset="0"/>
-                </a:rPr>
-                <a:t>Schneeweis</a:t>
-              </a:r>
-              <a:r>
-                <a:rPr lang="en-GB" sz="500" dirty="0">
-                  <a:effectLst/>
-                  <a:latin typeface="Calibri" panose="020F0502020204030204" pitchFamily="34" charset="0"/>
-                  <a:cs typeface="Calibri" panose="020F0502020204030204" pitchFamily="34" charset="0"/>
-                </a:rPr>
-                <a:t>, J.; </a:t>
-              </a:r>
-              <a:r>
-                <a:rPr lang="en-GB" sz="500" dirty="0" err="1">
-                  <a:effectLst/>
-                  <a:latin typeface="Calibri" panose="020F0502020204030204" pitchFamily="34" charset="0"/>
-                  <a:cs typeface="Calibri" panose="020F0502020204030204" pitchFamily="34" charset="0"/>
-                </a:rPr>
-                <a:t>Berritt</a:t>
-              </a:r>
-              <a:r>
-                <a:rPr lang="en-GB" sz="500" dirty="0">
-                  <a:effectLst/>
-                  <a:latin typeface="Calibri" panose="020F0502020204030204" pitchFamily="34" charset="0"/>
-                  <a:cs typeface="Calibri" panose="020F0502020204030204" pitchFamily="34" charset="0"/>
-                </a:rPr>
-                <a:t>, S.; Shi, Z.-C.; </a:t>
-              </a:r>
-              <a:r>
-                <a:rPr lang="en-GB" sz="500" dirty="0" err="1">
-                  <a:effectLst/>
-                  <a:latin typeface="Calibri" panose="020F0502020204030204" pitchFamily="34" charset="0"/>
-                  <a:cs typeface="Calibri" panose="020F0502020204030204" pitchFamily="34" charset="0"/>
-                </a:rPr>
-                <a:t>Nantermet</a:t>
-              </a:r>
-              <a:r>
-                <a:rPr lang="en-GB" sz="500" dirty="0">
-                  <a:effectLst/>
-                  <a:latin typeface="Calibri" panose="020F0502020204030204" pitchFamily="34" charset="0"/>
-                  <a:cs typeface="Calibri" panose="020F0502020204030204" pitchFamily="34" charset="0"/>
-                </a:rPr>
-                <a:t>, P.; Liu, Y.; Helmy, R.; Welch, C. J.; </a:t>
-              </a:r>
-              <a:r>
-                <a:rPr lang="en-GB" sz="500" dirty="0" err="1">
-                  <a:effectLst/>
-                  <a:latin typeface="Calibri" panose="020F0502020204030204" pitchFamily="34" charset="0"/>
-                  <a:cs typeface="Calibri" panose="020F0502020204030204" pitchFamily="34" charset="0"/>
-                </a:rPr>
-                <a:t>Vachal</a:t>
-              </a:r>
-              <a:r>
-                <a:rPr lang="en-GB" sz="500" dirty="0">
-                  <a:effectLst/>
-                  <a:latin typeface="Calibri" panose="020F0502020204030204" pitchFamily="34" charset="0"/>
-                  <a:cs typeface="Calibri" panose="020F0502020204030204" pitchFamily="34" charset="0"/>
-                </a:rPr>
-                <a:t>, P.; Davies, I. W.; </a:t>
-              </a:r>
-              <a:r>
-                <a:rPr lang="en-GB" sz="500" dirty="0" err="1">
-                  <a:effectLst/>
-                  <a:latin typeface="Calibri" panose="020F0502020204030204" pitchFamily="34" charset="0"/>
-                  <a:cs typeface="Calibri" panose="020F0502020204030204" pitchFamily="34" charset="0"/>
-                </a:rPr>
-                <a:t>Cernak</a:t>
-              </a:r>
-              <a:r>
-                <a:rPr lang="en-GB" sz="500" dirty="0">
-                  <a:effectLst/>
-                  <a:latin typeface="Calibri" panose="020F0502020204030204" pitchFamily="34" charset="0"/>
-                  <a:cs typeface="Calibri" panose="020F0502020204030204" pitchFamily="34" charset="0"/>
-                </a:rPr>
-                <a:t>, T.; Dreher, S. D. Nanomole-Scale High-Throughput Chemistry for the Synthesis of Complex Molecules. </a:t>
-              </a:r>
-              <a:r>
-                <a:rPr lang="en-GB" sz="500" i="1" dirty="0">
-                  <a:effectLst/>
-                  <a:latin typeface="Calibri" panose="020F0502020204030204" pitchFamily="34" charset="0"/>
-                  <a:cs typeface="Calibri" panose="020F0502020204030204" pitchFamily="34" charset="0"/>
-                </a:rPr>
-                <a:t>Science</a:t>
-              </a:r>
-              <a:r>
-                <a:rPr lang="en-GB" sz="500" dirty="0">
-                  <a:effectLst/>
-                  <a:latin typeface="Calibri" panose="020F0502020204030204" pitchFamily="34" charset="0"/>
-                  <a:cs typeface="Calibri" panose="020F0502020204030204" pitchFamily="34" charset="0"/>
-                </a:rPr>
-                <a:t> </a:t>
-              </a:r>
-              <a:r>
-                <a:rPr lang="en-GB" sz="500" b="1" dirty="0">
-                  <a:effectLst/>
-                  <a:latin typeface="Calibri" panose="020F0502020204030204" pitchFamily="34" charset="0"/>
-                  <a:cs typeface="Calibri" panose="020F0502020204030204" pitchFamily="34" charset="0"/>
-                </a:rPr>
-                <a:t>2015</a:t>
-              </a:r>
-              <a:r>
-                <a:rPr lang="en-GB" sz="500" dirty="0">
-                  <a:effectLst/>
-                  <a:latin typeface="Calibri" panose="020F0502020204030204" pitchFamily="34" charset="0"/>
-                  <a:cs typeface="Calibri" panose="020F0502020204030204" pitchFamily="34" charset="0"/>
-                </a:rPr>
-                <a:t>, </a:t>
-              </a:r>
-              <a:r>
-                <a:rPr lang="en-GB" sz="500" i="1" dirty="0">
-                  <a:effectLst/>
-                  <a:latin typeface="Calibri" panose="020F0502020204030204" pitchFamily="34" charset="0"/>
-                  <a:cs typeface="Calibri" panose="020F0502020204030204" pitchFamily="34" charset="0"/>
-                </a:rPr>
-                <a:t>347</a:t>
-              </a:r>
-              <a:r>
-                <a:rPr lang="en-GB" sz="500" dirty="0">
-                  <a:effectLst/>
-                  <a:latin typeface="Calibri" panose="020F0502020204030204" pitchFamily="34" charset="0"/>
-                  <a:cs typeface="Calibri" panose="020F0502020204030204" pitchFamily="34" charset="0"/>
-                </a:rPr>
-                <a:t> (6217), 49–53. </a:t>
-              </a:r>
-              <a:r>
-                <a:rPr lang="en-GB" sz="500" dirty="0">
-                  <a:effectLst/>
-                  <a:latin typeface="Calibri" panose="020F0502020204030204" pitchFamily="34" charset="0"/>
-                  <a:cs typeface="Calibri" panose="020F0502020204030204" pitchFamily="34" charset="0"/>
-                  <a:hlinkClick r:id="rId9"/>
-                </a:rPr>
-                <a:t>https://doi.org/10.1126/science.1259203</a:t>
-              </a:r>
-              <a:r>
-                <a:rPr lang="en-GB" sz="500" dirty="0">
-                  <a:effectLst/>
-                  <a:latin typeface="Calibri" panose="020F0502020204030204" pitchFamily="34" charset="0"/>
-                  <a:cs typeface="Calibri" panose="020F0502020204030204" pitchFamily="34" charset="0"/>
-                </a:rPr>
-                <a:t>.</a:t>
-              </a:r>
-            </a:p>
-            <a:p>
-              <a:endParaRPr lang="en-GB" sz="500" dirty="0">
+              <a:endParaRPr lang="en-GB" sz="900" dirty="0">
                 <a:latin typeface="Calibri" panose="020F0502020204030204" pitchFamily="34" charset="0"/>
                 <a:cs typeface="Calibri" panose="020F0502020204030204" pitchFamily="34" charset="0"/>
               </a:endParaRPr>
@@ -17062,9 +16085,9 @@
         <p:grpSpPr>
           <a:xfrm>
             <a:off x="4128671" y="784029"/>
-            <a:ext cx="4664668" cy="1889183"/>
+            <a:ext cx="4664668" cy="1726564"/>
             <a:chOff x="4131271" y="791065"/>
-            <a:chExt cx="4664668" cy="1889183"/>
+            <a:chExt cx="4664668" cy="1726564"/>
           </a:xfrm>
         </p:grpSpPr>
         <p:sp>
@@ -17130,7 +16153,7 @@
           <p:spPr>
             <a:xfrm>
               <a:off x="4131271" y="1033684"/>
-              <a:ext cx="2012055" cy="1646564"/>
+              <a:ext cx="2012055" cy="1384954"/>
             </a:xfrm>
             <a:prstGeom prst="rect">
               <a:avLst/>
@@ -17170,101 +16193,36 @@
             </a:p>
             <a:p>
               <a:r>
-                <a:rPr lang="en" sz="500" dirty="0">
-                  <a:solidFill>
-                    <a:schemeClr val="dk1"/>
-                  </a:solidFill>
-                  <a:latin typeface="Calibri"/>
-                  <a:ea typeface="Calibri"/>
-                  <a:cs typeface="Calibri"/>
-                  <a:sym typeface="Calibri"/>
-                </a:rPr>
-                <a:t>Reference:</a:t>
-              </a:r>
-              <a:r>
-                <a:rPr lang="en" sz="500" dirty="0">
-                  <a:solidFill>
-                    <a:schemeClr val="dk1"/>
-                  </a:solidFill>
-                  <a:latin typeface="Calibri" panose="020F0502020204030204" pitchFamily="34" charset="0"/>
-                  <a:ea typeface="Calibri"/>
-                  <a:cs typeface="Calibri" panose="020F0502020204030204" pitchFamily="34" charset="0"/>
-                  <a:sym typeface="Calibri"/>
-                </a:rPr>
-                <a:t> </a:t>
-              </a:r>
-              <a:r>
-                <a:rPr lang="en-GB" sz="500" dirty="0">
+                <a:rPr lang="en-GB" sz="600" dirty="0">
                   <a:effectLst/>
                   <a:latin typeface="Calibri" panose="020F0502020204030204" pitchFamily="34" charset="0"/>
                   <a:cs typeface="Calibri" panose="020F0502020204030204" pitchFamily="34" charset="0"/>
                 </a:rPr>
-                <a:t>Shields, B.J., Stevens, J., Li, J., </a:t>
+                <a:t>Reference: Bayesian reaction optimization as a tool for chemical synthesis, Nature, 2021, </a:t>
               </a:r>
               <a:r>
-                <a:rPr lang="en-GB" sz="500" dirty="0" err="1">
+                <a:rPr lang="en-GB" sz="600" i="1" dirty="0">
                   <a:effectLst/>
                   <a:latin typeface="Calibri" panose="020F0502020204030204" pitchFamily="34" charset="0"/>
                   <a:cs typeface="Calibri" panose="020F0502020204030204" pitchFamily="34" charset="0"/>
                 </a:rPr>
-                <a:t>Parasram</a:t>
+                <a:t>590 </a:t>
               </a:r>
               <a:r>
-                <a:rPr lang="en-GB" sz="500" dirty="0">
+                <a:rPr lang="en-GB" sz="600" dirty="0">
                   <a:effectLst/>
                   <a:latin typeface="Calibri" panose="020F0502020204030204" pitchFamily="34" charset="0"/>
                   <a:cs typeface="Calibri" panose="020F0502020204030204" pitchFamily="34" charset="0"/>
                 </a:rPr>
-                <a:t>, M., </a:t>
+                <a:t>(7844), 89–96.</a:t>
               </a:r>
-              <a:r>
-                <a:rPr lang="en-GB" sz="500" dirty="0" err="1">
-                  <a:effectLst/>
-                  <a:latin typeface="Calibri" panose="020F0502020204030204" pitchFamily="34" charset="0"/>
-                  <a:cs typeface="Calibri" panose="020F0502020204030204" pitchFamily="34" charset="0"/>
-                </a:rPr>
-                <a:t>Damani</a:t>
-              </a:r>
-              <a:r>
-                <a:rPr lang="en-GB" sz="500" dirty="0">
-                  <a:effectLst/>
-                  <a:latin typeface="Calibri" panose="020F0502020204030204" pitchFamily="34" charset="0"/>
-                  <a:cs typeface="Calibri" panose="020F0502020204030204" pitchFamily="34" charset="0"/>
-                </a:rPr>
-                <a:t>, F., Alvarado, J.I.M., Janey, J.M., Adams, R.P., Doyle, A.G., 2021. Bayesian reaction optimization as a tool for chemical synthesis. Nature 590, 89–96. </a:t>
-              </a:r>
-              <a:r>
-                <a:rPr lang="en-GB" sz="500" dirty="0">
-                  <a:effectLst/>
-                  <a:latin typeface="Calibri" panose="020F0502020204030204" pitchFamily="34" charset="0"/>
-                  <a:cs typeface="Calibri" panose="020F0502020204030204" pitchFamily="34" charset="0"/>
-                  <a:hlinkClick r:id="rId10"/>
-                </a:rPr>
-                <a:t>https://doi.org/10.1038/s41586-021-03213-y</a:t>
-              </a:r>
-              <a:endParaRPr lang="en-GB" sz="400" dirty="0">
-                <a:effectLst/>
-                <a:latin typeface="Calibri" panose="020F0502020204030204" pitchFamily="34" charset="0"/>
-                <a:cs typeface="Calibri" panose="020F0502020204030204" pitchFamily="34" charset="0"/>
-              </a:endParaRPr>
-            </a:p>
-            <a:p>
-              <a:pPr marL="0" marR="0" lvl="0" indent="0" algn="l" rtl="0">
-                <a:spcBef>
-                  <a:spcPts val="0"/>
-                </a:spcBef>
-                <a:spcAft>
-                  <a:spcPts val="0"/>
-                </a:spcAft>
-                <a:buNone/>
-              </a:pPr>
-              <a:endParaRPr lang="en" sz="900" dirty="0">
+              <a:endParaRPr lang="en" sz="800" dirty="0">
                 <a:solidFill>
                   <a:schemeClr val="dk1"/>
                 </a:solidFill>
-                <a:latin typeface="Calibri"/>
+                <a:latin typeface="Calibri" panose="020F0502020204030204" pitchFamily="34" charset="0"/>
                 <a:ea typeface="Calibri"/>
-                <a:cs typeface="Calibri"/>
+                <a:cs typeface="Calibri" panose="020F0502020204030204" pitchFamily="34" charset="0"/>
                 <a:sym typeface="Calibri"/>
               </a:endParaRPr>
             </a:p>
@@ -17337,10 +16295,10 @@
         </p:nvGrpSpPr>
         <p:grpSpPr>
           <a:xfrm>
-            <a:off x="6522465" y="2623150"/>
-            <a:ext cx="2271600" cy="1728000"/>
-            <a:chOff x="6212645" y="2554178"/>
-            <a:chExt cx="2271600" cy="1728000"/>
+            <a:off x="6476745" y="2623150"/>
+            <a:ext cx="2317320" cy="1728000"/>
+            <a:chOff x="6166925" y="2554178"/>
+            <a:chExt cx="2317320" cy="1728000"/>
           </a:xfrm>
         </p:grpSpPr>
         <p:sp>
@@ -17463,7 +16421,7 @@
           </p:nvSpPr>
           <p:spPr>
             <a:xfrm>
-              <a:off x="6227885" y="2777859"/>
+              <a:off x="6166925" y="2790051"/>
               <a:ext cx="2194800" cy="1477287"/>
             </a:xfrm>
             <a:prstGeom prst="rect">
@@ -17582,7 +16540,7 @@
           </p:nvSpPr>
           <p:spPr>
             <a:xfrm>
-              <a:off x="2181240" y="1024173"/>
+              <a:off x="2193432" y="1024173"/>
               <a:ext cx="1830504" cy="1339200"/>
             </a:xfrm>
             <a:prstGeom prst="rect">
@@ -17889,7 +16847,7 @@
           <p:nvPr/>
         </p:nvPicPr>
         <p:blipFill rotWithShape="1">
-          <a:blip r:embed="rId11"/>
+          <a:blip r:embed="rId7"/>
           <a:srcRect l="7275" t="9941" r="8086" b="5366"/>
           <a:stretch/>
         </p:blipFill>
@@ -17918,7 +16876,7 @@
           <p:nvPr/>
         </p:nvPicPr>
         <p:blipFill rotWithShape="1">
-          <a:blip r:embed="rId12"/>
+          <a:blip r:embed="rId8"/>
           <a:srcRect l="647" t="3393" r="2786" b="7465"/>
           <a:stretch/>
         </p:blipFill>
@@ -17947,7 +16905,7 @@
           <p:nvPr/>
         </p:nvPicPr>
         <p:blipFill rotWithShape="1">
-          <a:blip r:embed="rId13"/>
+          <a:blip r:embed="rId9"/>
           <a:srcRect r="16573"/>
           <a:stretch/>
         </p:blipFill>
@@ -17976,7 +16934,7 @@
           <p:nvPr/>
         </p:nvPicPr>
         <p:blipFill>
-          <a:blip r:embed="rId14"/>
+          <a:blip r:embed="rId10"/>
           <a:stretch>
             <a:fillRect/>
           </a:stretch>
@@ -18006,7 +16964,7 @@
           <p:nvPr/>
         </p:nvPicPr>
         <p:blipFill>
-          <a:blip r:embed="rId15"/>
+          <a:blip r:embed="rId11"/>
           <a:stretch>
             <a:fillRect/>
           </a:stretch>
@@ -18036,7 +16994,7 @@
           <p:nvPr/>
         </p:nvPicPr>
         <p:blipFill>
-          <a:blip r:embed="rId16"/>
+          <a:blip r:embed="rId12"/>
           <a:stretch>
             <a:fillRect/>
           </a:stretch>
@@ -18066,7 +17024,7 @@
           <p:nvPr/>
         </p:nvPicPr>
         <p:blipFill>
-          <a:blip r:embed="rId17"/>
+          <a:blip r:embed="rId13"/>
           <a:stretch>
             <a:fillRect/>
           </a:stretch>
@@ -18096,7 +17054,7 @@
           <p:nvPr/>
         </p:nvPicPr>
         <p:blipFill>
-          <a:blip r:embed="rId18"/>
+          <a:blip r:embed="rId14"/>
           <a:stretch>
             <a:fillRect/>
           </a:stretch>
@@ -18105,6 +17063,35 @@
           <a:xfrm>
             <a:off x="8565657" y="2663423"/>
             <a:ext cx="205564" cy="198000"/>
+          </a:xfrm>
+          <a:prstGeom prst="rect">
+            <a:avLst/>
+          </a:prstGeom>
+        </p:spPr>
+      </p:pic>
+      <p:pic>
+        <p:nvPicPr>
+          <p:cNvPr id="44" name="Picture 43">
+            <a:extLst>
+              <a:ext uri="{FF2B5EF4-FFF2-40B4-BE49-F238E27FC236}">
+                <a16:creationId xmlns:a16="http://schemas.microsoft.com/office/drawing/2014/main" id="{63D07E1B-DDD6-4EC0-AE3D-4D661E4254A0}"/>
+              </a:ext>
+            </a:extLst>
+          </p:cNvPr>
+          <p:cNvPicPr>
+            <a:picLocks noChangeAspect="1"/>
+          </p:cNvPicPr>
+          <p:nvPr/>
+        </p:nvPicPr>
+        <p:blipFill rotWithShape="1">
+          <a:blip r:embed="rId15"/>
+          <a:srcRect l="766" t="1768" r="2842" b="3130"/>
+          <a:stretch/>
+        </p:blipFill>
+        <p:spPr>
+          <a:xfrm>
+            <a:off x="2919985" y="2913888"/>
+            <a:ext cx="1726567" cy="1440000"/>
           </a:xfrm>
           <a:prstGeom prst="rect">
             <a:avLst/>

</xml_diff>

<commit_message>
Added Prof Niranjan's name to the poster
</commit_message>
<xml_diff>
--- a/Poster/AI3SD Poster.pptx
+++ b/Poster/AI3SD Poster.pptx
@@ -15285,7 +15285,7 @@
         <p:spPr>
           <a:xfrm>
             <a:off x="-91440" y="-18374"/>
-            <a:ext cx="5329488" cy="692457"/>
+            <a:ext cx="5380118" cy="754012"/>
           </a:xfrm>
           <a:prstGeom prst="rect">
             <a:avLst/>
@@ -15311,7 +15311,7 @@
               <a:buNone/>
             </a:pPr>
             <a:r>
-              <a:rPr lang="en" sz="1800" b="1" i="0" u="none" strike="noStrike" cap="none" dirty="0">
+              <a:rPr lang="en" b="1" i="0" u="none" strike="noStrike" cap="none" dirty="0">
                 <a:solidFill>
                   <a:schemeClr val="lt1"/>
                 </a:solidFill>
@@ -15322,7 +15322,7 @@
               </a:rPr>
               <a:t>Bayesian optimisation in Chemistry</a:t>
             </a:r>
-            <a:endParaRPr dirty="0"/>
+            <a:endParaRPr sz="1100" dirty="0"/>
           </a:p>
           <a:p>
             <a:pPr marL="0" marR="0" lvl="0" indent="0" algn="ctr" rtl="0">
@@ -15335,7 +15335,7 @@
               <a:buNone/>
             </a:pPr>
             <a:r>
-              <a:rPr lang="en" sz="1050" b="1" i="0" u="none" strike="noStrike" cap="none" dirty="0">
+              <a:rPr lang="en" sz="950" b="1" i="0" u="none" strike="noStrike" cap="none" dirty="0">
                 <a:solidFill>
                   <a:schemeClr val="lt1"/>
                 </a:solidFill>
@@ -15344,9 +15344,125 @@
                 <a:cs typeface="Tahoma"/>
                 <a:sym typeface="Tahoma"/>
               </a:rPr>
-              <a:t>Rubaiyat Khondaker, Department of Mathematics, University of Cambridge</a:t>
+              <a:t>Rubaiyat Khondaker</a:t>
             </a:r>
-            <a:endParaRPr dirty="0"/>
+            <a:r>
+              <a:rPr lang="en" sz="950" b="1" i="0" u="none" strike="noStrike" cap="none" baseline="30000" dirty="0">
+                <a:solidFill>
+                  <a:schemeClr val="lt1"/>
+                </a:solidFill>
+                <a:latin typeface="Tahoma"/>
+                <a:ea typeface="Tahoma"/>
+                <a:cs typeface="Tahoma"/>
+                <a:sym typeface="Tahoma"/>
+              </a:rPr>
+              <a:t>1</a:t>
+            </a:r>
+            <a:r>
+              <a:rPr lang="en" sz="950" b="1" i="0" u="none" strike="noStrike" cap="none" dirty="0">
+                <a:solidFill>
+                  <a:schemeClr val="lt1"/>
+                </a:solidFill>
+                <a:latin typeface="Tahoma"/>
+                <a:ea typeface="Tahoma"/>
+                <a:cs typeface="Tahoma"/>
+                <a:sym typeface="Tahoma"/>
+              </a:rPr>
+              <a:t>, Stephen Gow</a:t>
+            </a:r>
+            <a:r>
+              <a:rPr lang="en" sz="950" b="1" i="0" u="none" strike="noStrike" cap="none" baseline="30000" dirty="0">
+                <a:solidFill>
+                  <a:schemeClr val="lt1"/>
+                </a:solidFill>
+                <a:latin typeface="Tahoma"/>
+                <a:ea typeface="Tahoma"/>
+                <a:cs typeface="Tahoma"/>
+                <a:sym typeface="Tahoma"/>
+              </a:rPr>
+              <a:t>2</a:t>
+            </a:r>
+            <a:r>
+              <a:rPr lang="en" sz="950" b="1" i="0" u="none" strike="noStrike" cap="none" dirty="0">
+                <a:solidFill>
+                  <a:schemeClr val="lt1"/>
+                </a:solidFill>
+                <a:latin typeface="Tahoma"/>
+                <a:ea typeface="Tahoma"/>
+                <a:cs typeface="Tahoma"/>
+                <a:sym typeface="Tahoma"/>
+              </a:rPr>
+              <a:t>, </a:t>
+            </a:r>
+            <a:r>
+              <a:rPr lang="en" sz="950" b="1" dirty="0">
+                <a:solidFill>
+                  <a:schemeClr val="lt1"/>
+                </a:solidFill>
+                <a:latin typeface="Tahoma"/>
+                <a:ea typeface="Tahoma"/>
+                <a:cs typeface="Tahoma"/>
+                <a:sym typeface="Tahoma"/>
+              </a:rPr>
+              <a:t>Mahesan Niranjan</a:t>
+            </a:r>
+            <a:r>
+              <a:rPr lang="en" sz="950" b="1" baseline="30000" dirty="0">
+                <a:solidFill>
+                  <a:schemeClr val="lt1"/>
+                </a:solidFill>
+                <a:latin typeface="Tahoma"/>
+                <a:ea typeface="Tahoma"/>
+                <a:cs typeface="Tahoma"/>
+                <a:sym typeface="Tahoma"/>
+              </a:rPr>
+              <a:t>3</a:t>
+            </a:r>
+            <a:r>
+              <a:rPr lang="en" sz="950" b="1" dirty="0">
+                <a:solidFill>
+                  <a:schemeClr val="lt1"/>
+                </a:solidFill>
+                <a:latin typeface="Tahoma"/>
+                <a:ea typeface="Tahoma"/>
+                <a:cs typeface="Tahoma"/>
+                <a:sym typeface="Tahoma"/>
+              </a:rPr>
+              <a:t>, </a:t>
+            </a:r>
+            <a:r>
+              <a:rPr lang="en" sz="950" b="1" i="0" u="none" strike="noStrike" cap="none" dirty="0">
+                <a:solidFill>
+                  <a:schemeClr val="lt1"/>
+                </a:solidFill>
+                <a:latin typeface="Tahoma"/>
+                <a:ea typeface="Tahoma"/>
+                <a:cs typeface="Tahoma"/>
+                <a:sym typeface="Tahoma"/>
+              </a:rPr>
+              <a:t>Jeremy Frey</a:t>
+            </a:r>
+            <a:r>
+              <a:rPr lang="en" sz="950" b="1" i="0" u="none" strike="noStrike" cap="none" baseline="30000" dirty="0">
+                <a:solidFill>
+                  <a:schemeClr val="lt1"/>
+                </a:solidFill>
+                <a:latin typeface="Tahoma"/>
+                <a:ea typeface="Tahoma"/>
+                <a:cs typeface="Tahoma"/>
+                <a:sym typeface="Tahoma"/>
+              </a:rPr>
+              <a:t>2</a:t>
+            </a:r>
+            <a:endParaRPr lang="en" sz="950" b="1" i="0" u="none" strike="noStrike" cap="none" dirty="0">
+              <a:solidFill>
+                <a:schemeClr val="lt1"/>
+              </a:solidFill>
+              <a:latin typeface="Tahoma"/>
+              <a:ea typeface="Tahoma"/>
+              <a:cs typeface="Tahoma"/>
+              <a:sym typeface="Tahoma"/>
+            </a:endParaRPr>
           </a:p>
           <a:p>
             <a:pPr marL="0" marR="0" lvl="0" indent="0" algn="ctr" rtl="0">
@@ -15359,7 +15475,115 @@
               <a:buNone/>
             </a:pPr>
             <a:r>
-              <a:rPr lang="en" sz="1050" b="1" i="0" u="none" strike="noStrike" cap="none" dirty="0">
+              <a:rPr lang="en" sz="600" b="1" i="0" u="none" strike="noStrike" cap="none" baseline="30000" dirty="0">
+                <a:solidFill>
+                  <a:schemeClr val="lt1"/>
+                </a:solidFill>
+                <a:latin typeface="Tahoma"/>
+                <a:ea typeface="Tahoma"/>
+                <a:cs typeface="Tahoma"/>
+                <a:sym typeface="Tahoma"/>
+              </a:rPr>
+              <a:t>1</a:t>
+            </a:r>
+            <a:r>
+              <a:rPr lang="en" sz="600" b="1" i="0" u="none" strike="noStrike" cap="none" dirty="0">
+                <a:solidFill>
+                  <a:schemeClr val="lt1"/>
+                </a:solidFill>
+                <a:latin typeface="Tahoma"/>
+                <a:ea typeface="Tahoma"/>
+                <a:cs typeface="Tahoma"/>
+                <a:sym typeface="Tahoma"/>
+              </a:rPr>
+              <a:t>Department of Mathematics, University of Cambridge; </a:t>
+            </a:r>
+            <a:r>
+              <a:rPr lang="en" sz="600" b="1" baseline="30000" dirty="0">
+                <a:solidFill>
+                  <a:schemeClr val="lt1"/>
+                </a:solidFill>
+                <a:latin typeface="Tahoma"/>
+                <a:ea typeface="Tahoma"/>
+                <a:cs typeface="Tahoma"/>
+                <a:sym typeface="Tahoma"/>
+              </a:rPr>
+              <a:t>2</a:t>
+            </a:r>
+            <a:r>
+              <a:rPr lang="en" sz="600" b="1" dirty="0">
+                <a:solidFill>
+                  <a:schemeClr val="lt1"/>
+                </a:solidFill>
+                <a:latin typeface="Tahoma"/>
+                <a:ea typeface="Tahoma"/>
+                <a:cs typeface="Tahoma"/>
+                <a:sym typeface="Tahoma"/>
+              </a:rPr>
+              <a:t>Department of Chemistry, U</a:t>
+            </a:r>
+            <a:r>
+              <a:rPr lang="en-GB" sz="600" b="1" dirty="0">
+                <a:solidFill>
+                  <a:schemeClr val="lt1"/>
+                </a:solidFill>
+                <a:latin typeface="Tahoma"/>
+                <a:ea typeface="Tahoma"/>
+                <a:cs typeface="Tahoma"/>
+                <a:sym typeface="Tahoma"/>
+              </a:rPr>
+              <a:t>n</a:t>
+            </a:r>
+            <a:r>
+              <a:rPr lang="en" sz="600" b="1" dirty="0">
+                <a:solidFill>
+                  <a:schemeClr val="lt1"/>
+                </a:solidFill>
+                <a:latin typeface="Tahoma"/>
+                <a:ea typeface="Tahoma"/>
+                <a:cs typeface="Tahoma"/>
+                <a:sym typeface="Tahoma"/>
+              </a:rPr>
+              <a:t>iversity of Southampton; </a:t>
+            </a:r>
+            <a:r>
+              <a:rPr lang="en" sz="600" b="1" baseline="30000" dirty="0">
+                <a:solidFill>
+                  <a:schemeClr val="lt1"/>
+                </a:solidFill>
+                <a:latin typeface="Tahoma"/>
+                <a:ea typeface="Tahoma"/>
+                <a:cs typeface="Tahoma"/>
+                <a:sym typeface="Tahoma"/>
+              </a:rPr>
+              <a:t>3</a:t>
+            </a:r>
+            <a:r>
+              <a:rPr lang="en" sz="600" b="1" dirty="0">
+                <a:solidFill>
+                  <a:schemeClr val="lt1"/>
+                </a:solidFill>
+                <a:latin typeface="Tahoma"/>
+                <a:ea typeface="Tahoma"/>
+                <a:cs typeface="Tahoma"/>
+                <a:sym typeface="Tahoma"/>
+              </a:rPr>
+              <a:t>Department of Electronics and Computer Science, University of Southampton</a:t>
+            </a:r>
+            <a:endParaRPr sz="900" dirty="0"/>
+          </a:p>
+          <a:p>
+            <a:pPr marL="0" marR="0" lvl="0" indent="0" algn="ctr" rtl="0">
+              <a:spcBef>
+                <a:spcPts val="0"/>
+              </a:spcBef>
+              <a:spcAft>
+                <a:spcPts val="0"/>
+              </a:spcAft>
+              <a:buNone/>
+            </a:pPr>
+            <a:r>
+              <a:rPr lang="en" sz="600" b="1" i="0" u="none" strike="noStrike" cap="none" dirty="0">
                 <a:solidFill>
                   <a:schemeClr val="lt1"/>
                 </a:solidFill>
@@ -15370,7 +15594,7 @@
               </a:rPr>
               <a:t>rmk47@cam.ac.uk</a:t>
             </a:r>
-            <a:endParaRPr dirty="0"/>
+            <a:endParaRPr sz="900" dirty="0"/>
           </a:p>
         </p:txBody>
       </p:sp>
@@ -15639,9 +15863,9 @@
         <p:grpSpPr>
           <a:xfrm>
             <a:off x="341824" y="2623113"/>
-            <a:ext cx="2574736" cy="1763533"/>
+            <a:ext cx="2474225" cy="1736443"/>
             <a:chOff x="344424" y="2615101"/>
-            <a:chExt cx="2574736" cy="1763533"/>
+            <a:chExt cx="2474225" cy="1736443"/>
           </a:xfrm>
         </p:grpSpPr>
         <p:sp>
@@ -15764,8 +15988,8 @@
           </p:nvSpPr>
           <p:spPr>
             <a:xfrm>
-              <a:off x="1118361" y="2855180"/>
-              <a:ext cx="1800799" cy="1523454"/>
+              <a:off x="1227462" y="2828090"/>
+              <a:ext cx="1591187" cy="1523454"/>
             </a:xfrm>
             <a:prstGeom prst="rect">
               <a:avLst/>
@@ -15782,6 +16006,18 @@
             <a:lstStyle/>
             <a:p>
               <a:r>
+                <a:rPr lang="en" sz="900" b="1" dirty="0">
+                  <a:solidFill>
+                    <a:schemeClr val="dk1"/>
+                  </a:solidFill>
+                  <a:latin typeface="Calibri"/>
+                  <a:ea typeface="Calibri"/>
+                  <a:cs typeface="Calibri"/>
+                  <a:sym typeface="Calibri"/>
+                </a:rPr>
+                <a:t>Organic photovoltaic data</a:t>
+              </a:r>
+              <a:r>
                 <a:rPr lang="en" sz="900" dirty="0">
                   <a:solidFill>
                     <a:schemeClr val="dk1"/>
@@ -15791,7 +16027,31 @@
                   <a:cs typeface="Calibri"/>
                   <a:sym typeface="Calibri"/>
                 </a:rPr>
-                <a:t>Organic photovoltaic data tabulating molecular structures and power conversion efficiency. Global max c. 11.1%. EI took ~ 4 times as long as TS, but produced similar results. Optimiser only given molecular structure!</a:t>
+                <a:t> tabulating molecular structures and </a:t>
+              </a:r>
+              <a:r>
+                <a:rPr lang="en" sz="900" b="1" dirty="0">
+                  <a:solidFill>
+                    <a:schemeClr val="dk1"/>
+                  </a:solidFill>
+                  <a:latin typeface="Calibri"/>
+                  <a:ea typeface="Calibri"/>
+                  <a:cs typeface="Calibri"/>
+                  <a:sym typeface="Calibri"/>
+                </a:rPr>
+                <a:t>power conversion efficiency</a:t>
+              </a:r>
+              <a:r>
+                <a:rPr lang="en" sz="900" dirty="0">
+                  <a:solidFill>
+                    <a:schemeClr val="dk1"/>
+                  </a:solidFill>
+                  <a:latin typeface="Calibri"/>
+                  <a:ea typeface="Calibri"/>
+                  <a:cs typeface="Calibri"/>
+                  <a:sym typeface="Calibri"/>
+                </a:rPr>
+                <a:t>. Global max c. 11.1%. EI took ~ 4 times as long as TS, but produced similar results.</a:t>
               </a:r>
               <a:endParaRPr lang="en" sz="600" dirty="0">
                 <a:solidFill>
@@ -15870,9 +16130,9 @@
         <p:grpSpPr>
           <a:xfrm>
             <a:off x="2913550" y="2629925"/>
-            <a:ext cx="3505092" cy="1728000"/>
+            <a:ext cx="3576112" cy="1805786"/>
             <a:chOff x="2912350" y="2615175"/>
-            <a:chExt cx="3505092" cy="1728000"/>
+            <a:chExt cx="3576112" cy="1805786"/>
           </a:xfrm>
         </p:grpSpPr>
         <p:sp>
@@ -15937,8 +16197,8 @@
           </p:nvSpPr>
           <p:spPr>
             <a:xfrm>
-              <a:off x="4563408" y="2866730"/>
-              <a:ext cx="1854034" cy="1415732"/>
+              <a:off x="4549119" y="2866730"/>
+              <a:ext cx="1939343" cy="1554231"/>
             </a:xfrm>
             <a:prstGeom prst="rect">
               <a:avLst/>
@@ -15964,7 +16224,31 @@
                   <a:cs typeface="Calibri" panose="020F0502020204030204" pitchFamily="34" charset="0"/>
                   <a:sym typeface="Calibri"/>
                 </a:rPr>
-                <a:t>Optimising Area Count (LC-MS). Initial domain had “holes” due to disallowed combinations, so coded 0 as default.</a:t>
+                <a:t>Optimising Area Count (LC-MS). Initial domain had “holes” due to </a:t>
+              </a:r>
+              <a:r>
+                <a:rPr lang="en-GB" sz="900" b="1" dirty="0">
+                  <a:solidFill>
+                    <a:schemeClr val="dk1"/>
+                  </a:solidFill>
+                  <a:latin typeface="Calibri" panose="020F0502020204030204" pitchFamily="34" charset="0"/>
+                  <a:ea typeface="Calibri"/>
+                  <a:cs typeface="Calibri" panose="020F0502020204030204" pitchFamily="34" charset="0"/>
+                  <a:sym typeface="Calibri"/>
+                </a:rPr>
+                <a:t>disallowed combinations</a:t>
+              </a:r>
+              <a:r>
+                <a:rPr lang="en-GB" sz="900" dirty="0">
+                  <a:solidFill>
+                    <a:schemeClr val="dk1"/>
+                  </a:solidFill>
+                  <a:latin typeface="Calibri" panose="020F0502020204030204" pitchFamily="34" charset="0"/>
+                  <a:ea typeface="Calibri"/>
+                  <a:cs typeface="Calibri" panose="020F0502020204030204" pitchFamily="34" charset="0"/>
+                  <a:sym typeface="Calibri"/>
+                </a:rPr>
+                <a:t>, so coded 0 as default for these.</a:t>
               </a:r>
               <a:r>
                 <a:rPr lang="en-GB" sz="900" dirty="0">
@@ -15984,7 +16268,55 @@
                   <a:cs typeface="Calibri" panose="020F0502020204030204" pitchFamily="34" charset="0"/>
                   <a:sym typeface="Calibri"/>
                 </a:rPr>
-                <a:t>Produced poor results! Subsequently these combinations were excluded – performance markedly improved.</a:t>
+                <a:t>Produced </a:t>
+              </a:r>
+              <a:r>
+                <a:rPr lang="en-GB" sz="900" b="1" dirty="0">
+                  <a:solidFill>
+                    <a:schemeClr val="dk1"/>
+                  </a:solidFill>
+                  <a:latin typeface="Calibri" panose="020F0502020204030204" pitchFamily="34" charset="0"/>
+                  <a:ea typeface="Calibri"/>
+                  <a:cs typeface="Calibri" panose="020F0502020204030204" pitchFamily="34" charset="0"/>
+                  <a:sym typeface="Calibri"/>
+                </a:rPr>
+                <a:t>poor results</a:t>
+              </a:r>
+              <a:r>
+                <a:rPr lang="en-GB" sz="900" dirty="0">
+                  <a:solidFill>
+                    <a:schemeClr val="dk1"/>
+                  </a:solidFill>
+                  <a:latin typeface="Calibri" panose="020F0502020204030204" pitchFamily="34" charset="0"/>
+                  <a:ea typeface="Calibri"/>
+                  <a:cs typeface="Calibri" panose="020F0502020204030204" pitchFamily="34" charset="0"/>
+                  <a:sym typeface="Calibri"/>
+                </a:rPr>
+                <a:t> (pale colours). Subsequently these combinations were excluded – </a:t>
+              </a:r>
+              <a:r>
+                <a:rPr lang="en-GB" sz="900" b="1" dirty="0">
+                  <a:solidFill>
+                    <a:schemeClr val="dk1"/>
+                  </a:solidFill>
+                  <a:latin typeface="Calibri" panose="020F0502020204030204" pitchFamily="34" charset="0"/>
+                  <a:ea typeface="Calibri"/>
+                  <a:cs typeface="Calibri" panose="020F0502020204030204" pitchFamily="34" charset="0"/>
+                  <a:sym typeface="Calibri"/>
+                </a:rPr>
+                <a:t>average performance markedly improved</a:t>
+              </a:r>
+              <a:r>
+                <a:rPr lang="en-GB" sz="900" dirty="0">
+                  <a:solidFill>
+                    <a:schemeClr val="dk1"/>
+                  </a:solidFill>
+                  <a:latin typeface="Calibri" panose="020F0502020204030204" pitchFamily="34" charset="0"/>
+                  <a:ea typeface="Calibri"/>
+                  <a:cs typeface="Calibri" panose="020F0502020204030204" pitchFamily="34" charset="0"/>
+                  <a:sym typeface="Calibri"/>
+                </a:rPr>
+                <a:t>.</a:t>
               </a:r>
             </a:p>
             <a:p>
@@ -16085,9 +16417,9 @@
         <p:grpSpPr>
           <a:xfrm>
             <a:off x="4128671" y="784029"/>
-            <a:ext cx="4664668" cy="1726564"/>
+            <a:ext cx="4664668" cy="1766073"/>
             <a:chOff x="4131271" y="791065"/>
-            <a:chExt cx="4664668" cy="1726564"/>
+            <a:chExt cx="4664668" cy="1766073"/>
           </a:xfrm>
         </p:grpSpPr>
         <p:sp>
@@ -16153,7 +16485,7 @@
           <p:spPr>
             <a:xfrm>
               <a:off x="4131271" y="1033684"/>
-              <a:ext cx="2012055" cy="1384954"/>
+              <a:ext cx="2136971" cy="1523454"/>
             </a:xfrm>
             <a:prstGeom prst="rect">
               <a:avLst/>
@@ -16188,7 +16520,103 @@
                   <a:cs typeface="Calibri"/>
                   <a:sym typeface="Calibri"/>
                 </a:rPr>
-                <a:t>Original paper that designed the EDBO optimiser. Tested on Suzuki yield dataset with 50 random initialisations per configuration. Aim was to determine dependence on batch size. Results indicate stable performance. Expected improvement consistently outperforms thompson sampling.</a:t>
+                <a:t>From </a:t>
+              </a:r>
+              <a:r>
+                <a:rPr lang="en" sz="900" b="1" dirty="0">
+                  <a:solidFill>
+                    <a:schemeClr val="dk1"/>
+                  </a:solidFill>
+                  <a:latin typeface="Calibri"/>
+                  <a:ea typeface="Calibri"/>
+                  <a:cs typeface="Calibri"/>
+                  <a:sym typeface="Calibri"/>
+                </a:rPr>
+                <a:t>EDBO optimiser </a:t>
+              </a:r>
+              <a:r>
+                <a:rPr lang="en" sz="900" dirty="0">
+                  <a:solidFill>
+                    <a:schemeClr val="dk1"/>
+                  </a:solidFill>
+                  <a:latin typeface="Calibri"/>
+                  <a:ea typeface="Calibri"/>
+                  <a:cs typeface="Calibri"/>
+                  <a:sym typeface="Calibri"/>
+                </a:rPr>
+                <a:t>paper (Experimental Design in Bayesian Optimisation). Tested with </a:t>
+              </a:r>
+              <a:r>
+                <a:rPr lang="en" sz="900" b="1" dirty="0">
+                  <a:solidFill>
+                    <a:schemeClr val="dk1"/>
+                  </a:solidFill>
+                  <a:latin typeface="Calibri"/>
+                  <a:ea typeface="Calibri"/>
+                  <a:cs typeface="Calibri"/>
+                  <a:sym typeface="Calibri"/>
+                </a:rPr>
+                <a:t>50 random initialisations</a:t>
+              </a:r>
+              <a:r>
+                <a:rPr lang="en" sz="900" dirty="0">
+                  <a:solidFill>
+                    <a:schemeClr val="dk1"/>
+                  </a:solidFill>
+                  <a:latin typeface="Calibri"/>
+                  <a:ea typeface="Calibri"/>
+                  <a:cs typeface="Calibri"/>
+                  <a:sym typeface="Calibri"/>
+                </a:rPr>
+                <a:t> per configuration. Aim was to determine dependence of maximal observed yield on </a:t>
+              </a:r>
+              <a:r>
+                <a:rPr lang="en" sz="900" b="1" dirty="0">
+                  <a:solidFill>
+                    <a:schemeClr val="dk1"/>
+                  </a:solidFill>
+                  <a:latin typeface="Calibri"/>
+                  <a:ea typeface="Calibri"/>
+                  <a:cs typeface="Calibri"/>
+                  <a:sym typeface="Calibri"/>
+                </a:rPr>
+                <a:t>batch size</a:t>
+              </a:r>
+              <a:r>
+                <a:rPr lang="en" sz="900" dirty="0">
+                  <a:solidFill>
+                    <a:schemeClr val="dk1"/>
+                  </a:solidFill>
+                  <a:latin typeface="Calibri"/>
+                  <a:ea typeface="Calibri"/>
+                  <a:cs typeface="Calibri"/>
+                  <a:sym typeface="Calibri"/>
+                </a:rPr>
+                <a:t>. Results indicate </a:t>
+              </a:r>
+              <a:r>
+                <a:rPr lang="en" sz="900" b="1" dirty="0">
+                  <a:solidFill>
+                    <a:schemeClr val="dk1"/>
+                  </a:solidFill>
+                  <a:latin typeface="Calibri"/>
+                  <a:ea typeface="Calibri"/>
+                  <a:cs typeface="Calibri"/>
+                  <a:sym typeface="Calibri"/>
+                </a:rPr>
+                <a:t>stable performance</a:t>
+              </a:r>
+              <a:r>
+                <a:rPr lang="en" sz="900" dirty="0">
+                  <a:solidFill>
+                    <a:schemeClr val="dk1"/>
+                  </a:solidFill>
+                  <a:latin typeface="Calibri"/>
+                  <a:ea typeface="Calibri"/>
+                  <a:cs typeface="Calibri"/>
+                  <a:sym typeface="Calibri"/>
+                </a:rPr>
+                <a:t>. Expected improvement (EI) consistently outperforms Thompson Sampling (TS).</a:t>
               </a:r>
             </a:p>
             <a:p>
@@ -16448,6 +16876,18 @@
                 <a:buNone/>
               </a:pPr>
               <a:r>
+                <a:rPr lang="en" sz="900" b="1" dirty="0">
+                  <a:solidFill>
+                    <a:schemeClr val="dk1"/>
+                  </a:solidFill>
+                  <a:latin typeface="Calibri"/>
+                  <a:ea typeface="Calibri"/>
+                  <a:cs typeface="Calibri"/>
+                  <a:sym typeface="Calibri"/>
+                </a:rPr>
+                <a:t>Bayesian optimisation</a:t>
+              </a:r>
+              <a:r>
                 <a:rPr lang="en" sz="900" dirty="0">
                   <a:solidFill>
                     <a:schemeClr val="dk1"/>
@@ -16457,9 +16897,141 @@
                   <a:cs typeface="Calibri"/>
                   <a:sym typeface="Calibri"/>
                 </a:rPr>
-                <a:t>Bayesian optimisation is a promising technique with the potential to be used across a wide variety of problems. Only small modifications were required to transfer an algorithm built for reaction yield optimisation into a very different domain. Future work could explore noisy objective functions, ‘generative’ optimisation, time-dependent objective functions, or other problem domains.</a:t>
+                <a:t> is a promising technique with the potential to be used across a </a:t>
               </a:r>
-              <a:endParaRPr dirty="0"/>
+              <a:r>
+                <a:rPr lang="en" sz="900" b="1" dirty="0">
+                  <a:solidFill>
+                    <a:schemeClr val="dk1"/>
+                  </a:solidFill>
+                  <a:latin typeface="Calibri"/>
+                  <a:ea typeface="Calibri"/>
+                  <a:cs typeface="Calibri"/>
+                  <a:sym typeface="Calibri"/>
+                </a:rPr>
+                <a:t>wide variety of problems</a:t>
+              </a:r>
+              <a:r>
+                <a:rPr lang="en" sz="900" dirty="0">
+                  <a:solidFill>
+                    <a:schemeClr val="dk1"/>
+                  </a:solidFill>
+                  <a:latin typeface="Calibri"/>
+                  <a:ea typeface="Calibri"/>
+                  <a:cs typeface="Calibri"/>
+                  <a:sym typeface="Calibri"/>
+                </a:rPr>
+                <a:t>. Only </a:t>
+              </a:r>
+              <a:r>
+                <a:rPr lang="en" sz="900" b="1" dirty="0">
+                  <a:solidFill>
+                    <a:schemeClr val="dk1"/>
+                  </a:solidFill>
+                  <a:latin typeface="Calibri"/>
+                  <a:ea typeface="Calibri"/>
+                  <a:cs typeface="Calibri"/>
+                  <a:sym typeface="Calibri"/>
+                </a:rPr>
+                <a:t>small modifications</a:t>
+              </a:r>
+              <a:r>
+                <a:rPr lang="en" sz="900" dirty="0">
+                  <a:solidFill>
+                    <a:schemeClr val="dk1"/>
+                  </a:solidFill>
+                  <a:latin typeface="Calibri"/>
+                  <a:ea typeface="Calibri"/>
+                  <a:cs typeface="Calibri"/>
+                  <a:sym typeface="Calibri"/>
+                </a:rPr>
+                <a:t> were required to transfer an algorithm built for reaction yield optimisation into a very different domain. Future work could explore </a:t>
+              </a:r>
+              <a:r>
+                <a:rPr lang="en" sz="900" b="1" dirty="0">
+                  <a:solidFill>
+                    <a:schemeClr val="dk1"/>
+                  </a:solidFill>
+                  <a:latin typeface="Calibri"/>
+                  <a:ea typeface="Calibri"/>
+                  <a:cs typeface="Calibri"/>
+                  <a:sym typeface="Calibri"/>
+                </a:rPr>
+                <a:t>noisy</a:t>
+              </a:r>
+              <a:r>
+                <a:rPr lang="en" sz="900" dirty="0">
+                  <a:solidFill>
+                    <a:schemeClr val="dk1"/>
+                  </a:solidFill>
+                  <a:latin typeface="Calibri"/>
+                  <a:ea typeface="Calibri"/>
+                  <a:cs typeface="Calibri"/>
+                  <a:sym typeface="Calibri"/>
+                </a:rPr>
+                <a:t> objective functions, </a:t>
+              </a:r>
+              <a:r>
+                <a:rPr lang="en" sz="900" b="1" dirty="0">
+                  <a:solidFill>
+                    <a:schemeClr val="dk1"/>
+                  </a:solidFill>
+                  <a:latin typeface="Calibri"/>
+                  <a:ea typeface="Calibri"/>
+                  <a:cs typeface="Calibri"/>
+                  <a:sym typeface="Calibri"/>
+                </a:rPr>
+                <a:t>‘generative’</a:t>
+              </a:r>
+              <a:r>
+                <a:rPr lang="en" sz="900" dirty="0">
+                  <a:solidFill>
+                    <a:schemeClr val="dk1"/>
+                  </a:solidFill>
+                  <a:latin typeface="Calibri"/>
+                  <a:ea typeface="Calibri"/>
+                  <a:cs typeface="Calibri"/>
+                  <a:sym typeface="Calibri"/>
+                </a:rPr>
+                <a:t> optimisation, </a:t>
+              </a:r>
+              <a:r>
+                <a:rPr lang="en" sz="900" b="1" dirty="0">
+                  <a:solidFill>
+                    <a:schemeClr val="dk1"/>
+                  </a:solidFill>
+                  <a:latin typeface="Calibri"/>
+                  <a:ea typeface="Calibri"/>
+                  <a:cs typeface="Calibri"/>
+                  <a:sym typeface="Calibri"/>
+                </a:rPr>
+                <a:t>time-dependent</a:t>
+              </a:r>
+              <a:r>
+                <a:rPr lang="en" sz="900" dirty="0">
+                  <a:solidFill>
+                    <a:schemeClr val="dk1"/>
+                  </a:solidFill>
+                  <a:latin typeface="Calibri"/>
+                  <a:ea typeface="Calibri"/>
+                  <a:cs typeface="Calibri"/>
+                  <a:sym typeface="Calibri"/>
+                </a:rPr>
+                <a:t> objective functions, or </a:t>
+              </a:r>
+              <a:r>
+                <a:rPr lang="en" sz="900" b="1" dirty="0">
+                  <a:solidFill>
+                    <a:schemeClr val="dk1"/>
+                  </a:solidFill>
+                  <a:latin typeface="Calibri"/>
+                  <a:ea typeface="Calibri"/>
+                  <a:cs typeface="Calibri"/>
+                  <a:sym typeface="Calibri"/>
+                </a:rPr>
+                <a:t>other problem domains.</a:t>
+              </a:r>
+              <a:endParaRPr b="1" dirty="0"/>
             </a:p>
           </p:txBody>
         </p:sp>
@@ -16541,7 +17113,7 @@
           <p:spPr>
             <a:xfrm>
               <a:off x="2193432" y="1024173"/>
-              <a:ext cx="1830504" cy="1339200"/>
+              <a:ext cx="1830504" cy="1338788"/>
             </a:xfrm>
             <a:prstGeom prst="rect">
               <a:avLst/>
@@ -16769,7 +17341,6 @@
                 </a:rPr>
                 <a:t> is preferred.</a:t>
               </a:r>
-              <a:endParaRPr dirty="0"/>
             </a:p>
           </p:txBody>
         </p:sp>
@@ -16863,64 +17434,6 @@
       </p:pic>
       <p:pic>
         <p:nvPicPr>
-          <p:cNvPr id="7" name="Picture 6" descr="Chart&#10;&#10;Description automatically generated">
-            <a:extLst>
-              <a:ext uri="{FF2B5EF4-FFF2-40B4-BE49-F238E27FC236}">
-                <a16:creationId xmlns:a16="http://schemas.microsoft.com/office/drawing/2014/main" id="{B4F24207-205D-4F4E-B775-4D26BB784687}"/>
-              </a:ext>
-            </a:extLst>
-          </p:cNvPr>
-          <p:cNvPicPr>
-            <a:picLocks noChangeAspect="1"/>
-          </p:cNvPicPr>
-          <p:nvPr/>
-        </p:nvPicPr>
-        <p:blipFill rotWithShape="1">
-          <a:blip r:embed="rId8"/>
-          <a:srcRect l="647" t="3393" r="2786" b="7465"/>
-          <a:stretch/>
-        </p:blipFill>
-        <p:spPr>
-          <a:xfrm>
-            <a:off x="6032269" y="1068191"/>
-            <a:ext cx="2747248" cy="1440000"/>
-          </a:xfrm>
-          <a:prstGeom prst="rect">
-            <a:avLst/>
-          </a:prstGeom>
-        </p:spPr>
-      </p:pic>
-      <p:pic>
-        <p:nvPicPr>
-          <p:cNvPr id="9" name="Picture 8" descr="Chart, box and whisker chart&#10;&#10;Description automatically generated">
-            <a:extLst>
-              <a:ext uri="{FF2B5EF4-FFF2-40B4-BE49-F238E27FC236}">
-                <a16:creationId xmlns:a16="http://schemas.microsoft.com/office/drawing/2014/main" id="{DB70D7E7-E904-4450-BECC-4B1761820BB6}"/>
-              </a:ext>
-            </a:extLst>
-          </p:cNvPr>
-          <p:cNvPicPr>
-            <a:picLocks noChangeAspect="1"/>
-          </p:cNvPicPr>
-          <p:nvPr/>
-        </p:nvPicPr>
-        <p:blipFill rotWithShape="1">
-          <a:blip r:embed="rId9"/>
-          <a:srcRect r="16573"/>
-          <a:stretch/>
-        </p:blipFill>
-        <p:spPr>
-          <a:xfrm>
-            <a:off x="340681" y="2897120"/>
-            <a:ext cx="852919" cy="1476000"/>
-          </a:xfrm>
-          <a:prstGeom prst="rect">
-            <a:avLst/>
-          </a:prstGeom>
-        </p:spPr>
-      </p:pic>
-      <p:pic>
-        <p:nvPicPr>
           <p:cNvPr id="11" name="Picture 10" descr="A picture containing text, stationary, envelope, businesscard&#10;&#10;Description automatically generated">
             <a:extLst>
               <a:ext uri="{FF2B5EF4-FFF2-40B4-BE49-F238E27FC236}">
@@ -16934,14 +17447,14 @@
           <p:nvPr/>
         </p:nvPicPr>
         <p:blipFill>
-          <a:blip r:embed="rId10"/>
+          <a:blip r:embed="rId8"/>
           <a:stretch>
             <a:fillRect/>
           </a:stretch>
         </p:blipFill>
         <p:spPr>
           <a:xfrm>
-            <a:off x="3816044" y="814815"/>
+            <a:off x="3816044" y="807671"/>
             <a:ext cx="208709" cy="198000"/>
           </a:xfrm>
           <a:prstGeom prst="rect">
@@ -16964,14 +17477,14 @@
           <p:nvPr/>
         </p:nvPicPr>
         <p:blipFill>
-          <a:blip r:embed="rId11"/>
+          <a:blip r:embed="rId9"/>
           <a:stretch>
             <a:fillRect/>
           </a:stretch>
         </p:blipFill>
         <p:spPr>
           <a:xfrm>
-            <a:off x="8569194" y="819296"/>
+            <a:off x="8569194" y="812152"/>
             <a:ext cx="197160" cy="198000"/>
           </a:xfrm>
           <a:prstGeom prst="rect">
@@ -16994,14 +17507,14 @@
           <p:nvPr/>
         </p:nvPicPr>
         <p:blipFill>
-          <a:blip r:embed="rId12"/>
+          <a:blip r:embed="rId10"/>
           <a:stretch>
             <a:fillRect/>
           </a:stretch>
         </p:blipFill>
         <p:spPr>
           <a:xfrm>
-            <a:off x="2562332" y="2664555"/>
+            <a:off x="2562332" y="2657411"/>
             <a:ext cx="209605" cy="198000"/>
           </a:xfrm>
           <a:prstGeom prst="rect">
@@ -17024,14 +17537,14 @@
           <p:nvPr/>
         </p:nvPicPr>
         <p:blipFill>
-          <a:blip r:embed="rId13"/>
+          <a:blip r:embed="rId11"/>
           <a:stretch>
             <a:fillRect/>
           </a:stretch>
         </p:blipFill>
         <p:spPr>
           <a:xfrm>
-            <a:off x="6173463" y="2666640"/>
+            <a:off x="6173463" y="2659496"/>
             <a:ext cx="203564" cy="198000"/>
           </a:xfrm>
           <a:prstGeom prst="rect">
@@ -17054,14 +17567,14 @@
           <p:nvPr/>
         </p:nvPicPr>
         <p:blipFill>
-          <a:blip r:embed="rId14"/>
+          <a:blip r:embed="rId12"/>
           <a:stretch>
             <a:fillRect/>
           </a:stretch>
         </p:blipFill>
         <p:spPr>
           <a:xfrm>
-            <a:off x="8565657" y="2663423"/>
+            <a:off x="8565657" y="2641991"/>
             <a:ext cx="205564" cy="198000"/>
           </a:xfrm>
           <a:prstGeom prst="rect">
@@ -17071,10 +17584,68 @@
       </p:pic>
       <p:pic>
         <p:nvPicPr>
-          <p:cNvPr id="44" name="Picture 43">
+          <p:cNvPr id="6" name="Picture 5" descr="Chart&#10;&#10;Description automatically generated">
             <a:extLst>
               <a:ext uri="{FF2B5EF4-FFF2-40B4-BE49-F238E27FC236}">
-                <a16:creationId xmlns:a16="http://schemas.microsoft.com/office/drawing/2014/main" id="{63D07E1B-DDD6-4EC0-AE3D-4D661E4254A0}"/>
+                <a16:creationId xmlns:a16="http://schemas.microsoft.com/office/drawing/2014/main" id="{332A6F78-245E-4CB0-AC6D-95DC9A518B6E}"/>
+              </a:ext>
+            </a:extLst>
+          </p:cNvPr>
+          <p:cNvPicPr>
+            <a:picLocks noChangeAspect="1"/>
+          </p:cNvPicPr>
+          <p:nvPr/>
+        </p:nvPicPr>
+        <p:blipFill rotWithShape="1">
+          <a:blip r:embed="rId13"/>
+          <a:srcRect l="3721" t="2590" r="3097" b="7465"/>
+          <a:stretch/>
+        </p:blipFill>
+        <p:spPr>
+          <a:xfrm>
+            <a:off x="6165082" y="1058934"/>
+            <a:ext cx="2627230" cy="1440000"/>
+          </a:xfrm>
+          <a:prstGeom prst="rect">
+            <a:avLst/>
+          </a:prstGeom>
+        </p:spPr>
+      </p:pic>
+      <p:pic>
+        <p:nvPicPr>
+          <p:cNvPr id="3" name="Picture 2" descr="Graphical user interface, chart&#10;&#10;Description automatically generated">
+            <a:extLst>
+              <a:ext uri="{FF2B5EF4-FFF2-40B4-BE49-F238E27FC236}">
+                <a16:creationId xmlns:a16="http://schemas.microsoft.com/office/drawing/2014/main" id="{F05CA5C9-4EF9-43B6-8BA7-F668B6A8D5FA}"/>
+              </a:ext>
+            </a:extLst>
+          </p:cNvPr>
+          <p:cNvPicPr>
+            <a:picLocks noChangeAspect="1"/>
+          </p:cNvPicPr>
+          <p:nvPr/>
+        </p:nvPicPr>
+        <p:blipFill rotWithShape="1">
+          <a:blip r:embed="rId14"/>
+          <a:srcRect l="1321" t="1736" r="2191" b="3788"/>
+          <a:stretch/>
+        </p:blipFill>
+        <p:spPr>
+          <a:xfrm>
+            <a:off x="2924832" y="2906533"/>
+            <a:ext cx="1739746" cy="1440000"/>
+          </a:xfrm>
+          <a:prstGeom prst="rect">
+            <a:avLst/>
+          </a:prstGeom>
+        </p:spPr>
+      </p:pic>
+      <p:pic>
+        <p:nvPicPr>
+          <p:cNvPr id="9" name="Picture 8">
+            <a:extLst>
+              <a:ext uri="{FF2B5EF4-FFF2-40B4-BE49-F238E27FC236}">
+                <a16:creationId xmlns:a16="http://schemas.microsoft.com/office/drawing/2014/main" id="{1BCA1F66-44B8-4D09-996C-CB30DADEEF13}"/>
               </a:ext>
             </a:extLst>
           </p:cNvPr>
@@ -17085,13 +17656,13 @@
         </p:nvPicPr>
         <p:blipFill rotWithShape="1">
           <a:blip r:embed="rId15"/>
-          <a:srcRect l="766" t="1768" r="2842" b="3130"/>
+          <a:srcRect l="2824" t="458" r="3463" b="3471"/>
           <a:stretch/>
         </p:blipFill>
         <p:spPr>
           <a:xfrm>
-            <a:off x="2919985" y="2913888"/>
-            <a:ext cx="1726567" cy="1440000"/>
+            <a:off x="357167" y="2893237"/>
+            <a:ext cx="972942" cy="1440000"/>
           </a:xfrm>
           <a:prstGeom prst="rect">
             <a:avLst/>

</xml_diff>